<commit_message>
Add apidocs to docs folder
</commit_message>
<xml_diff>
--- a/docs/SM3 Presentation.pptx
+++ b/docs/SM3 Presentation.pptx
@@ -113,6 +113,2365 @@
     </a:lvl9pPr>
   </p:defaultTextStyle>
 </p:presentation>
+</file>
+
+<file path=ppt/diagrams/colors1.xml><?xml version="1.0" encoding="utf-8"?>
+<dgm:colorsDef xmlns:dgm="http://schemas.openxmlformats.org/drawingml/2006/diagram" xmlns:a="http://schemas.openxmlformats.org/drawingml/2006/main" uniqueId="urn:microsoft.com/office/officeart/2005/8/colors/accent1_2">
+  <dgm:title val=""/>
+  <dgm:desc val=""/>
+  <dgm:catLst>
+    <dgm:cat type="accent1" pri="11200"/>
+  </dgm:catLst>
+  <dgm:styleLbl name="node0">
+    <dgm:fillClrLst meth="repeat">
+      <a:schemeClr val="accent1"/>
+    </dgm:fillClrLst>
+    <dgm:linClrLst meth="repeat">
+      <a:schemeClr val="lt1"/>
+    </dgm:linClrLst>
+    <dgm:effectClrLst/>
+    <dgm:txLinClrLst/>
+    <dgm:txFillClrLst/>
+    <dgm:txEffectClrLst/>
+  </dgm:styleLbl>
+  <dgm:styleLbl name="alignNode1">
+    <dgm:fillClrLst meth="repeat">
+      <a:schemeClr val="accent1"/>
+    </dgm:fillClrLst>
+    <dgm:linClrLst meth="repeat">
+      <a:schemeClr val="accent1"/>
+    </dgm:linClrLst>
+    <dgm:effectClrLst/>
+    <dgm:txLinClrLst/>
+    <dgm:txFillClrLst/>
+    <dgm:txEffectClrLst/>
+  </dgm:styleLbl>
+  <dgm:styleLbl name="node1">
+    <dgm:fillClrLst meth="repeat">
+      <a:schemeClr val="accent1"/>
+    </dgm:fillClrLst>
+    <dgm:linClrLst meth="repeat">
+      <a:schemeClr val="lt1"/>
+    </dgm:linClrLst>
+    <dgm:effectClrLst/>
+    <dgm:txLinClrLst/>
+    <dgm:txFillClrLst/>
+    <dgm:txEffectClrLst/>
+  </dgm:styleLbl>
+  <dgm:styleLbl name="lnNode1">
+    <dgm:fillClrLst meth="repeat">
+      <a:schemeClr val="accent1"/>
+    </dgm:fillClrLst>
+    <dgm:linClrLst meth="repeat">
+      <a:schemeClr val="lt1"/>
+    </dgm:linClrLst>
+    <dgm:effectClrLst/>
+    <dgm:txLinClrLst/>
+    <dgm:txFillClrLst/>
+    <dgm:txEffectClrLst/>
+  </dgm:styleLbl>
+  <dgm:styleLbl name="vennNode1">
+    <dgm:fillClrLst meth="repeat">
+      <a:schemeClr val="accent1">
+        <a:alpha val="50000"/>
+      </a:schemeClr>
+    </dgm:fillClrLst>
+    <dgm:linClrLst meth="repeat">
+      <a:schemeClr val="lt1"/>
+    </dgm:linClrLst>
+    <dgm:effectClrLst/>
+    <dgm:txLinClrLst/>
+    <dgm:txFillClrLst/>
+    <dgm:txEffectClrLst/>
+  </dgm:styleLbl>
+  <dgm:styleLbl name="node2">
+    <dgm:fillClrLst meth="repeat">
+      <a:schemeClr val="accent1"/>
+    </dgm:fillClrLst>
+    <dgm:linClrLst meth="repeat">
+      <a:schemeClr val="lt1"/>
+    </dgm:linClrLst>
+    <dgm:effectClrLst/>
+    <dgm:txLinClrLst/>
+    <dgm:txFillClrLst/>
+    <dgm:txEffectClrLst/>
+  </dgm:styleLbl>
+  <dgm:styleLbl name="node3">
+    <dgm:fillClrLst meth="repeat">
+      <a:schemeClr val="accent1"/>
+    </dgm:fillClrLst>
+    <dgm:linClrLst meth="repeat">
+      <a:schemeClr val="lt1"/>
+    </dgm:linClrLst>
+    <dgm:effectClrLst/>
+    <dgm:txLinClrLst/>
+    <dgm:txFillClrLst/>
+    <dgm:txEffectClrLst/>
+  </dgm:styleLbl>
+  <dgm:styleLbl name="node4">
+    <dgm:fillClrLst meth="repeat">
+      <a:schemeClr val="accent1"/>
+    </dgm:fillClrLst>
+    <dgm:linClrLst meth="repeat">
+      <a:schemeClr val="lt1"/>
+    </dgm:linClrLst>
+    <dgm:effectClrLst/>
+    <dgm:txLinClrLst/>
+    <dgm:txFillClrLst/>
+    <dgm:txEffectClrLst/>
+  </dgm:styleLbl>
+  <dgm:styleLbl name="fgImgPlace1">
+    <dgm:fillClrLst meth="repeat">
+      <a:schemeClr val="accent1">
+        <a:tint val="50000"/>
+      </a:schemeClr>
+    </dgm:fillClrLst>
+    <dgm:linClrLst meth="repeat">
+      <a:schemeClr val="lt1"/>
+    </dgm:linClrLst>
+    <dgm:effectClrLst/>
+    <dgm:txLinClrLst/>
+    <dgm:txFillClrLst meth="repeat">
+      <a:schemeClr val="lt1"/>
+    </dgm:txFillClrLst>
+    <dgm:txEffectClrLst/>
+  </dgm:styleLbl>
+  <dgm:styleLbl name="alignImgPlace1">
+    <dgm:fillClrLst meth="repeat">
+      <a:schemeClr val="accent1">
+        <a:tint val="50000"/>
+      </a:schemeClr>
+    </dgm:fillClrLst>
+    <dgm:linClrLst meth="repeat">
+      <a:schemeClr val="lt1"/>
+    </dgm:linClrLst>
+    <dgm:effectClrLst/>
+    <dgm:txLinClrLst/>
+    <dgm:txFillClrLst meth="repeat">
+      <a:schemeClr val="lt1"/>
+    </dgm:txFillClrLst>
+    <dgm:txEffectClrLst/>
+  </dgm:styleLbl>
+  <dgm:styleLbl name="bgImgPlace1">
+    <dgm:fillClrLst meth="repeat">
+      <a:schemeClr val="accent1">
+        <a:tint val="50000"/>
+      </a:schemeClr>
+    </dgm:fillClrLst>
+    <dgm:linClrLst meth="repeat">
+      <a:schemeClr val="lt1"/>
+    </dgm:linClrLst>
+    <dgm:effectClrLst/>
+    <dgm:txLinClrLst/>
+    <dgm:txFillClrLst meth="repeat">
+      <a:schemeClr val="lt1"/>
+    </dgm:txFillClrLst>
+    <dgm:txEffectClrLst/>
+  </dgm:styleLbl>
+  <dgm:styleLbl name="sibTrans2D1">
+    <dgm:fillClrLst meth="repeat">
+      <a:schemeClr val="accent1">
+        <a:tint val="60000"/>
+      </a:schemeClr>
+    </dgm:fillClrLst>
+    <dgm:linClrLst meth="repeat">
+      <a:schemeClr val="accent1">
+        <a:tint val="60000"/>
+      </a:schemeClr>
+    </dgm:linClrLst>
+    <dgm:effectClrLst/>
+    <dgm:txLinClrLst/>
+    <dgm:txFillClrLst/>
+    <dgm:txEffectClrLst/>
+  </dgm:styleLbl>
+  <dgm:styleLbl name="fgSibTrans2D1">
+    <dgm:fillClrLst meth="repeat">
+      <a:schemeClr val="accent1">
+        <a:tint val="60000"/>
+      </a:schemeClr>
+    </dgm:fillClrLst>
+    <dgm:linClrLst meth="repeat">
+      <a:schemeClr val="accent1">
+        <a:tint val="60000"/>
+      </a:schemeClr>
+    </dgm:linClrLst>
+    <dgm:effectClrLst/>
+    <dgm:txLinClrLst/>
+    <dgm:txFillClrLst/>
+    <dgm:txEffectClrLst/>
+  </dgm:styleLbl>
+  <dgm:styleLbl name="bgSibTrans2D1">
+    <dgm:fillClrLst meth="repeat">
+      <a:schemeClr val="accent1">
+        <a:tint val="60000"/>
+      </a:schemeClr>
+    </dgm:fillClrLst>
+    <dgm:linClrLst meth="repeat">
+      <a:schemeClr val="accent1">
+        <a:tint val="60000"/>
+      </a:schemeClr>
+    </dgm:linClrLst>
+    <dgm:effectClrLst/>
+    <dgm:txLinClrLst/>
+    <dgm:txFillClrLst/>
+    <dgm:txEffectClrLst/>
+  </dgm:styleLbl>
+  <dgm:styleLbl name="sibTrans1D1">
+    <dgm:fillClrLst meth="repeat">
+      <a:schemeClr val="accent1"/>
+    </dgm:fillClrLst>
+    <dgm:linClrLst meth="repeat">
+      <a:schemeClr val="accent1"/>
+    </dgm:linClrLst>
+    <dgm:effectClrLst/>
+    <dgm:txLinClrLst/>
+    <dgm:txFillClrLst meth="repeat">
+      <a:schemeClr val="tx1"/>
+    </dgm:txFillClrLst>
+    <dgm:txEffectClrLst/>
+  </dgm:styleLbl>
+  <dgm:styleLbl name="callout">
+    <dgm:fillClrLst meth="repeat">
+      <a:schemeClr val="accent1"/>
+    </dgm:fillClrLst>
+    <dgm:linClrLst meth="repeat">
+      <a:schemeClr val="accent1">
+        <a:tint val="50000"/>
+      </a:schemeClr>
+    </dgm:linClrLst>
+    <dgm:effectClrLst/>
+    <dgm:txLinClrLst/>
+    <dgm:txFillClrLst meth="repeat">
+      <a:schemeClr val="tx1"/>
+    </dgm:txFillClrLst>
+    <dgm:txEffectClrLst/>
+  </dgm:styleLbl>
+  <dgm:styleLbl name="asst0">
+    <dgm:fillClrLst meth="repeat">
+      <a:schemeClr val="accent1"/>
+    </dgm:fillClrLst>
+    <dgm:linClrLst meth="repeat">
+      <a:schemeClr val="lt1"/>
+    </dgm:linClrLst>
+    <dgm:effectClrLst/>
+    <dgm:txLinClrLst/>
+    <dgm:txFillClrLst/>
+    <dgm:txEffectClrLst/>
+  </dgm:styleLbl>
+  <dgm:styleLbl name="asst1">
+    <dgm:fillClrLst meth="repeat">
+      <a:schemeClr val="accent1"/>
+    </dgm:fillClrLst>
+    <dgm:linClrLst meth="repeat">
+      <a:schemeClr val="lt1"/>
+    </dgm:linClrLst>
+    <dgm:effectClrLst/>
+    <dgm:txLinClrLst/>
+    <dgm:txFillClrLst/>
+    <dgm:txEffectClrLst/>
+  </dgm:styleLbl>
+  <dgm:styleLbl name="asst2">
+    <dgm:fillClrLst meth="repeat">
+      <a:schemeClr val="accent1"/>
+    </dgm:fillClrLst>
+    <dgm:linClrLst meth="repeat">
+      <a:schemeClr val="lt1"/>
+    </dgm:linClrLst>
+    <dgm:effectClrLst/>
+    <dgm:txLinClrLst/>
+    <dgm:txFillClrLst/>
+    <dgm:txEffectClrLst/>
+  </dgm:styleLbl>
+  <dgm:styleLbl name="asst3">
+    <dgm:fillClrLst meth="repeat">
+      <a:schemeClr val="accent1"/>
+    </dgm:fillClrLst>
+    <dgm:linClrLst meth="repeat">
+      <a:schemeClr val="lt1"/>
+    </dgm:linClrLst>
+    <dgm:effectClrLst/>
+    <dgm:txLinClrLst/>
+    <dgm:txFillClrLst/>
+    <dgm:txEffectClrLst/>
+  </dgm:styleLbl>
+  <dgm:styleLbl name="asst4">
+    <dgm:fillClrLst meth="repeat">
+      <a:schemeClr val="accent1"/>
+    </dgm:fillClrLst>
+    <dgm:linClrLst meth="repeat">
+      <a:schemeClr val="lt1"/>
+    </dgm:linClrLst>
+    <dgm:effectClrLst/>
+    <dgm:txLinClrLst/>
+    <dgm:txFillClrLst/>
+    <dgm:txEffectClrLst/>
+  </dgm:styleLbl>
+  <dgm:styleLbl name="parChTrans2D1">
+    <dgm:fillClrLst meth="repeat">
+      <a:schemeClr val="accent1">
+        <a:tint val="60000"/>
+      </a:schemeClr>
+    </dgm:fillClrLst>
+    <dgm:linClrLst meth="repeat">
+      <a:schemeClr val="accent1">
+        <a:tint val="60000"/>
+      </a:schemeClr>
+    </dgm:linClrLst>
+    <dgm:effectClrLst/>
+    <dgm:txLinClrLst/>
+    <dgm:txFillClrLst meth="repeat">
+      <a:schemeClr val="lt1"/>
+    </dgm:txFillClrLst>
+    <dgm:txEffectClrLst/>
+  </dgm:styleLbl>
+  <dgm:styleLbl name="parChTrans2D2">
+    <dgm:fillClrLst meth="repeat">
+      <a:schemeClr val="accent1"/>
+    </dgm:fillClrLst>
+    <dgm:linClrLst meth="repeat">
+      <a:schemeClr val="accent1"/>
+    </dgm:linClrLst>
+    <dgm:effectClrLst/>
+    <dgm:txLinClrLst/>
+    <dgm:txFillClrLst meth="repeat">
+      <a:schemeClr val="lt1"/>
+    </dgm:txFillClrLst>
+    <dgm:txEffectClrLst/>
+  </dgm:styleLbl>
+  <dgm:styleLbl name="parChTrans2D3">
+    <dgm:fillClrLst meth="repeat">
+      <a:schemeClr val="accent1"/>
+    </dgm:fillClrLst>
+    <dgm:linClrLst meth="repeat">
+      <a:schemeClr val="accent1"/>
+    </dgm:linClrLst>
+    <dgm:effectClrLst/>
+    <dgm:txLinClrLst/>
+    <dgm:txFillClrLst meth="repeat">
+      <a:schemeClr val="lt1"/>
+    </dgm:txFillClrLst>
+    <dgm:txEffectClrLst/>
+  </dgm:styleLbl>
+  <dgm:styleLbl name="parChTrans2D4">
+    <dgm:fillClrLst meth="repeat">
+      <a:schemeClr val="accent1"/>
+    </dgm:fillClrLst>
+    <dgm:linClrLst meth="repeat">
+      <a:schemeClr val="accent1"/>
+    </dgm:linClrLst>
+    <dgm:effectClrLst/>
+    <dgm:txLinClrLst/>
+    <dgm:txFillClrLst meth="repeat">
+      <a:schemeClr val="lt1"/>
+    </dgm:txFillClrLst>
+    <dgm:txEffectClrLst/>
+  </dgm:styleLbl>
+  <dgm:styleLbl name="parChTrans1D1">
+    <dgm:fillClrLst meth="repeat">
+      <a:schemeClr val="accent1"/>
+    </dgm:fillClrLst>
+    <dgm:linClrLst meth="repeat">
+      <a:schemeClr val="accent1">
+        <a:shade val="60000"/>
+      </a:schemeClr>
+    </dgm:linClrLst>
+    <dgm:effectClrLst/>
+    <dgm:txLinClrLst/>
+    <dgm:txFillClrLst meth="repeat">
+      <a:schemeClr val="tx1"/>
+    </dgm:txFillClrLst>
+    <dgm:txEffectClrLst/>
+  </dgm:styleLbl>
+  <dgm:styleLbl name="parChTrans1D2">
+    <dgm:fillClrLst meth="repeat">
+      <a:schemeClr val="accent1"/>
+    </dgm:fillClrLst>
+    <dgm:linClrLst meth="repeat">
+      <a:schemeClr val="accent1">
+        <a:shade val="60000"/>
+      </a:schemeClr>
+    </dgm:linClrLst>
+    <dgm:effectClrLst/>
+    <dgm:txLinClrLst/>
+    <dgm:txFillClrLst meth="repeat">
+      <a:schemeClr val="tx1"/>
+    </dgm:txFillClrLst>
+    <dgm:txEffectClrLst/>
+  </dgm:styleLbl>
+  <dgm:styleLbl name="parChTrans1D3">
+    <dgm:fillClrLst meth="repeat">
+      <a:schemeClr val="accent1"/>
+    </dgm:fillClrLst>
+    <dgm:linClrLst meth="repeat">
+      <a:schemeClr val="accent1">
+        <a:shade val="80000"/>
+      </a:schemeClr>
+    </dgm:linClrLst>
+    <dgm:effectClrLst/>
+    <dgm:txLinClrLst/>
+    <dgm:txFillClrLst meth="repeat">
+      <a:schemeClr val="tx1"/>
+    </dgm:txFillClrLst>
+    <dgm:txEffectClrLst/>
+  </dgm:styleLbl>
+  <dgm:styleLbl name="parChTrans1D4">
+    <dgm:fillClrLst meth="repeat">
+      <a:schemeClr val="accent1"/>
+    </dgm:fillClrLst>
+    <dgm:linClrLst meth="repeat">
+      <a:schemeClr val="accent1">
+        <a:shade val="80000"/>
+      </a:schemeClr>
+    </dgm:linClrLst>
+    <dgm:effectClrLst/>
+    <dgm:txLinClrLst/>
+    <dgm:txFillClrLst meth="repeat">
+      <a:schemeClr val="tx1"/>
+    </dgm:txFillClrLst>
+    <dgm:txEffectClrLst/>
+  </dgm:styleLbl>
+  <dgm:styleLbl name="fgAcc1">
+    <dgm:fillClrLst meth="repeat">
+      <a:schemeClr val="lt1">
+        <a:alpha val="90000"/>
+      </a:schemeClr>
+    </dgm:fillClrLst>
+    <dgm:linClrLst meth="repeat">
+      <a:schemeClr val="accent1"/>
+    </dgm:linClrLst>
+    <dgm:effectClrLst/>
+    <dgm:txLinClrLst/>
+    <dgm:txFillClrLst meth="repeat">
+      <a:schemeClr val="dk1"/>
+    </dgm:txFillClrLst>
+    <dgm:txEffectClrLst/>
+  </dgm:styleLbl>
+  <dgm:styleLbl name="conFgAcc1">
+    <dgm:fillClrLst meth="repeat">
+      <a:schemeClr val="lt1">
+        <a:alpha val="90000"/>
+      </a:schemeClr>
+    </dgm:fillClrLst>
+    <dgm:linClrLst meth="repeat">
+      <a:schemeClr val="accent1"/>
+    </dgm:linClrLst>
+    <dgm:effectClrLst/>
+    <dgm:txLinClrLst/>
+    <dgm:txFillClrLst meth="repeat">
+      <a:schemeClr val="dk1"/>
+    </dgm:txFillClrLst>
+    <dgm:txEffectClrLst/>
+  </dgm:styleLbl>
+  <dgm:styleLbl name="alignAcc1">
+    <dgm:fillClrLst meth="repeat">
+      <a:schemeClr val="lt1">
+        <a:alpha val="90000"/>
+      </a:schemeClr>
+    </dgm:fillClrLst>
+    <dgm:linClrLst meth="repeat">
+      <a:schemeClr val="accent1"/>
+    </dgm:linClrLst>
+    <dgm:effectClrLst/>
+    <dgm:txLinClrLst/>
+    <dgm:txFillClrLst meth="repeat">
+      <a:schemeClr val="dk1"/>
+    </dgm:txFillClrLst>
+    <dgm:txEffectClrLst/>
+  </dgm:styleLbl>
+  <dgm:styleLbl name="trAlignAcc1">
+    <dgm:fillClrLst meth="repeat">
+      <a:schemeClr val="lt1">
+        <a:alpha val="40000"/>
+      </a:schemeClr>
+    </dgm:fillClrLst>
+    <dgm:linClrLst meth="repeat">
+      <a:schemeClr val="accent1"/>
+    </dgm:linClrLst>
+    <dgm:effectClrLst/>
+    <dgm:txLinClrLst/>
+    <dgm:txFillClrLst meth="repeat">
+      <a:schemeClr val="dk1"/>
+    </dgm:txFillClrLst>
+    <dgm:txEffectClrLst/>
+  </dgm:styleLbl>
+  <dgm:styleLbl name="bgAcc1">
+    <dgm:fillClrLst meth="repeat">
+      <a:schemeClr val="lt1">
+        <a:alpha val="90000"/>
+      </a:schemeClr>
+    </dgm:fillClrLst>
+    <dgm:linClrLst meth="repeat">
+      <a:schemeClr val="accent1"/>
+    </dgm:linClrLst>
+    <dgm:effectClrLst/>
+    <dgm:txLinClrLst/>
+    <dgm:txFillClrLst meth="repeat">
+      <a:schemeClr val="dk1"/>
+    </dgm:txFillClrLst>
+    <dgm:txEffectClrLst/>
+  </dgm:styleLbl>
+  <dgm:styleLbl name="solidFgAcc1">
+    <dgm:fillClrLst meth="repeat">
+      <a:schemeClr val="lt1"/>
+    </dgm:fillClrLst>
+    <dgm:linClrLst meth="repeat">
+      <a:schemeClr val="accent1"/>
+    </dgm:linClrLst>
+    <dgm:effectClrLst/>
+    <dgm:txLinClrLst/>
+    <dgm:txFillClrLst meth="repeat">
+      <a:schemeClr val="dk1"/>
+    </dgm:txFillClrLst>
+    <dgm:txEffectClrLst/>
+  </dgm:styleLbl>
+  <dgm:styleLbl name="solidAlignAcc1">
+    <dgm:fillClrLst meth="repeat">
+      <a:schemeClr val="lt1"/>
+    </dgm:fillClrLst>
+    <dgm:linClrLst meth="repeat">
+      <a:schemeClr val="accent1"/>
+    </dgm:linClrLst>
+    <dgm:effectClrLst/>
+    <dgm:txLinClrLst/>
+    <dgm:txFillClrLst meth="repeat">
+      <a:schemeClr val="dk1"/>
+    </dgm:txFillClrLst>
+    <dgm:txEffectClrLst/>
+  </dgm:styleLbl>
+  <dgm:styleLbl name="solidBgAcc1">
+    <dgm:fillClrLst meth="repeat">
+      <a:schemeClr val="lt1"/>
+    </dgm:fillClrLst>
+    <dgm:linClrLst meth="repeat">
+      <a:schemeClr val="accent1"/>
+    </dgm:linClrLst>
+    <dgm:effectClrLst/>
+    <dgm:txLinClrLst/>
+    <dgm:txFillClrLst meth="repeat">
+      <a:schemeClr val="dk1"/>
+    </dgm:txFillClrLst>
+    <dgm:txEffectClrLst/>
+  </dgm:styleLbl>
+  <dgm:styleLbl name="fgAccFollowNode1">
+    <dgm:fillClrLst meth="repeat">
+      <a:schemeClr val="accent1">
+        <a:alpha val="90000"/>
+        <a:tint val="40000"/>
+      </a:schemeClr>
+    </dgm:fillClrLst>
+    <dgm:linClrLst meth="repeat">
+      <a:schemeClr val="accent1">
+        <a:alpha val="90000"/>
+        <a:tint val="40000"/>
+      </a:schemeClr>
+    </dgm:linClrLst>
+    <dgm:effectClrLst/>
+    <dgm:txLinClrLst/>
+    <dgm:txFillClrLst meth="repeat">
+      <a:schemeClr val="dk1"/>
+    </dgm:txFillClrLst>
+    <dgm:txEffectClrLst/>
+  </dgm:styleLbl>
+  <dgm:styleLbl name="alignAccFollowNode1">
+    <dgm:fillClrLst meth="repeat">
+      <a:schemeClr val="accent1">
+        <a:alpha val="90000"/>
+        <a:tint val="40000"/>
+      </a:schemeClr>
+    </dgm:fillClrLst>
+    <dgm:linClrLst meth="repeat">
+      <a:schemeClr val="accent1">
+        <a:alpha val="90000"/>
+        <a:tint val="40000"/>
+      </a:schemeClr>
+    </dgm:linClrLst>
+    <dgm:effectClrLst/>
+    <dgm:txLinClrLst/>
+    <dgm:txFillClrLst meth="repeat">
+      <a:schemeClr val="dk1"/>
+    </dgm:txFillClrLst>
+    <dgm:txEffectClrLst/>
+  </dgm:styleLbl>
+  <dgm:styleLbl name="bgAccFollowNode1">
+    <dgm:fillClrLst meth="repeat">
+      <a:schemeClr val="accent1">
+        <a:alpha val="90000"/>
+        <a:tint val="40000"/>
+      </a:schemeClr>
+    </dgm:fillClrLst>
+    <dgm:linClrLst meth="repeat">
+      <a:schemeClr val="accent1">
+        <a:alpha val="90000"/>
+        <a:tint val="40000"/>
+      </a:schemeClr>
+    </dgm:linClrLst>
+    <dgm:effectClrLst/>
+    <dgm:txLinClrLst/>
+    <dgm:txFillClrLst meth="repeat">
+      <a:schemeClr val="dk1"/>
+    </dgm:txFillClrLst>
+    <dgm:txEffectClrLst/>
+  </dgm:styleLbl>
+  <dgm:styleLbl name="fgAcc0">
+    <dgm:fillClrLst meth="repeat">
+      <a:schemeClr val="lt1">
+        <a:alpha val="90000"/>
+      </a:schemeClr>
+    </dgm:fillClrLst>
+    <dgm:linClrLst meth="repeat">
+      <a:schemeClr val="accent1"/>
+    </dgm:linClrLst>
+    <dgm:effectClrLst/>
+    <dgm:txLinClrLst/>
+    <dgm:txFillClrLst meth="repeat">
+      <a:schemeClr val="dk1"/>
+    </dgm:txFillClrLst>
+    <dgm:txEffectClrLst/>
+  </dgm:styleLbl>
+  <dgm:styleLbl name="fgAcc2">
+    <dgm:fillClrLst meth="repeat">
+      <a:schemeClr val="lt1">
+        <a:alpha val="90000"/>
+      </a:schemeClr>
+    </dgm:fillClrLst>
+    <dgm:linClrLst meth="repeat">
+      <a:schemeClr val="accent1"/>
+    </dgm:linClrLst>
+    <dgm:effectClrLst/>
+    <dgm:txLinClrLst/>
+    <dgm:txFillClrLst meth="repeat">
+      <a:schemeClr val="dk1"/>
+    </dgm:txFillClrLst>
+    <dgm:txEffectClrLst/>
+  </dgm:styleLbl>
+  <dgm:styleLbl name="fgAcc3">
+    <dgm:fillClrLst meth="repeat">
+      <a:schemeClr val="lt1">
+        <a:alpha val="90000"/>
+      </a:schemeClr>
+    </dgm:fillClrLst>
+    <dgm:linClrLst meth="repeat">
+      <a:schemeClr val="accent1"/>
+    </dgm:linClrLst>
+    <dgm:effectClrLst/>
+    <dgm:txLinClrLst/>
+    <dgm:txFillClrLst meth="repeat">
+      <a:schemeClr val="dk1"/>
+    </dgm:txFillClrLst>
+    <dgm:txEffectClrLst/>
+  </dgm:styleLbl>
+  <dgm:styleLbl name="fgAcc4">
+    <dgm:fillClrLst meth="repeat">
+      <a:schemeClr val="lt1">
+        <a:alpha val="90000"/>
+      </a:schemeClr>
+    </dgm:fillClrLst>
+    <dgm:linClrLst meth="repeat">
+      <a:schemeClr val="accent1"/>
+    </dgm:linClrLst>
+    <dgm:effectClrLst/>
+    <dgm:txLinClrLst/>
+    <dgm:txFillClrLst meth="repeat">
+      <a:schemeClr val="dk1"/>
+    </dgm:txFillClrLst>
+    <dgm:txEffectClrLst/>
+  </dgm:styleLbl>
+  <dgm:styleLbl name="bgShp">
+    <dgm:fillClrLst meth="repeat">
+      <a:schemeClr val="accent1">
+        <a:tint val="40000"/>
+      </a:schemeClr>
+    </dgm:fillClrLst>
+    <dgm:linClrLst meth="repeat">
+      <a:schemeClr val="accent1"/>
+    </dgm:linClrLst>
+    <dgm:effectClrLst/>
+    <dgm:txLinClrLst/>
+    <dgm:txFillClrLst meth="repeat">
+      <a:schemeClr val="dk1"/>
+    </dgm:txFillClrLst>
+    <dgm:txEffectClrLst/>
+  </dgm:styleLbl>
+  <dgm:styleLbl name="dkBgShp">
+    <dgm:fillClrLst meth="repeat">
+      <a:schemeClr val="accent1">
+        <a:shade val="80000"/>
+      </a:schemeClr>
+    </dgm:fillClrLst>
+    <dgm:linClrLst meth="repeat">
+      <a:schemeClr val="accent1"/>
+    </dgm:linClrLst>
+    <dgm:effectClrLst/>
+    <dgm:txLinClrLst/>
+    <dgm:txFillClrLst meth="repeat">
+      <a:schemeClr val="lt1"/>
+    </dgm:txFillClrLst>
+    <dgm:txEffectClrLst/>
+  </dgm:styleLbl>
+  <dgm:styleLbl name="trBgShp">
+    <dgm:fillClrLst meth="repeat">
+      <a:schemeClr val="accent1">
+        <a:tint val="50000"/>
+        <a:alpha val="40000"/>
+      </a:schemeClr>
+    </dgm:fillClrLst>
+    <dgm:linClrLst meth="repeat">
+      <a:schemeClr val="accent1"/>
+    </dgm:linClrLst>
+    <dgm:effectClrLst/>
+    <dgm:txLinClrLst/>
+    <dgm:txFillClrLst meth="repeat">
+      <a:schemeClr val="lt1"/>
+    </dgm:txFillClrLst>
+    <dgm:txEffectClrLst/>
+  </dgm:styleLbl>
+  <dgm:styleLbl name="fgShp">
+    <dgm:fillClrLst meth="repeat">
+      <a:schemeClr val="accent1">
+        <a:tint val="60000"/>
+      </a:schemeClr>
+    </dgm:fillClrLst>
+    <dgm:linClrLst meth="repeat">
+      <a:schemeClr val="lt1"/>
+    </dgm:linClrLst>
+    <dgm:effectClrLst/>
+    <dgm:txLinClrLst/>
+    <dgm:txFillClrLst meth="repeat">
+      <a:schemeClr val="dk1"/>
+    </dgm:txFillClrLst>
+    <dgm:txEffectClrLst/>
+  </dgm:styleLbl>
+  <dgm:styleLbl name="revTx">
+    <dgm:fillClrLst meth="repeat">
+      <a:schemeClr val="lt1">
+        <a:alpha val="0"/>
+      </a:schemeClr>
+    </dgm:fillClrLst>
+    <dgm:linClrLst meth="repeat">
+      <a:schemeClr val="dk1">
+        <a:alpha val="0"/>
+      </a:schemeClr>
+    </dgm:linClrLst>
+    <dgm:effectClrLst/>
+    <dgm:txLinClrLst/>
+    <dgm:txFillClrLst meth="repeat">
+      <a:schemeClr val="tx1"/>
+    </dgm:txFillClrLst>
+    <dgm:txEffectClrLst/>
+  </dgm:styleLbl>
+</dgm:colorsDef>
+</file>
+
+<file path=ppt/diagrams/data1.xml><?xml version="1.0" encoding="utf-8"?>
+<dgm:dataModel xmlns:dgm="http://schemas.openxmlformats.org/drawingml/2006/diagram" xmlns:a="http://schemas.openxmlformats.org/drawingml/2006/main">
+  <dgm:ptLst>
+    <dgm:pt modelId="{48C1D273-D682-46A5-9B06-68A46861FEF0}" type="doc">
+      <dgm:prSet loTypeId="urn:microsoft.com/office/officeart/2005/8/layout/default" loCatId="list" qsTypeId="urn:microsoft.com/office/officeart/2005/8/quickstyle/simple1" qsCatId="simple" csTypeId="urn:microsoft.com/office/officeart/2005/8/colors/accent1_2" csCatId="accent1" phldr="1"/>
+      <dgm:spPr/>
+      <dgm:t>
+        <a:bodyPr/>
+        <a:lstStyle/>
+        <a:p>
+          <a:endParaRPr lang="en-US"/>
+        </a:p>
+      </dgm:t>
+    </dgm:pt>
+    <dgm:pt modelId="{C776C2D1-2FE4-436E-A7C6-13145062826B}">
+      <dgm:prSet phldrT="[Text]"/>
+      <dgm:spPr/>
+      <dgm:t>
+        <a:bodyPr/>
+        <a:lstStyle/>
+        <a:p>
+          <a:r>
+            <a:rPr lang="en-US" dirty="0"/>
+            <a:t>Model</a:t>
+          </a:r>
+        </a:p>
+      </dgm:t>
+    </dgm:pt>
+    <dgm:pt modelId="{548C42B6-3C90-403C-AFAA-7CFA35ED8F06}" type="parTrans" cxnId="{1ECE66AE-7A6B-489C-AAF3-D0B7BFE6FD4E}">
+      <dgm:prSet/>
+      <dgm:spPr/>
+      <dgm:t>
+        <a:bodyPr/>
+        <a:lstStyle/>
+        <a:p>
+          <a:endParaRPr lang="en-US"/>
+        </a:p>
+      </dgm:t>
+    </dgm:pt>
+    <dgm:pt modelId="{86F574C6-32E6-48FB-B48F-BE6A1757C303}" type="sibTrans" cxnId="{1ECE66AE-7A6B-489C-AAF3-D0B7BFE6FD4E}">
+      <dgm:prSet/>
+      <dgm:spPr/>
+      <dgm:t>
+        <a:bodyPr/>
+        <a:lstStyle/>
+        <a:p>
+          <a:endParaRPr lang="en-US"/>
+        </a:p>
+      </dgm:t>
+    </dgm:pt>
+    <dgm:pt modelId="{BEC230AA-7543-4CE1-B7D4-85C1B9660BFE}">
+      <dgm:prSet phldrT="[Text]"/>
+      <dgm:spPr/>
+      <dgm:t>
+        <a:bodyPr/>
+        <a:lstStyle/>
+        <a:p>
+          <a:r>
+            <a:rPr lang="en-US" dirty="0"/>
+            <a:t>View</a:t>
+          </a:r>
+        </a:p>
+      </dgm:t>
+    </dgm:pt>
+    <dgm:pt modelId="{E97394F5-529A-4808-B7B7-A515A15479D8}" type="parTrans" cxnId="{2602E493-A8A4-4D15-B20F-A6425241B836}">
+      <dgm:prSet/>
+      <dgm:spPr/>
+      <dgm:t>
+        <a:bodyPr/>
+        <a:lstStyle/>
+        <a:p>
+          <a:endParaRPr lang="en-US"/>
+        </a:p>
+      </dgm:t>
+    </dgm:pt>
+    <dgm:pt modelId="{EC0540FD-F3DB-4785-9684-60BC0B1326C9}" type="sibTrans" cxnId="{2602E493-A8A4-4D15-B20F-A6425241B836}">
+      <dgm:prSet/>
+      <dgm:spPr/>
+      <dgm:t>
+        <a:bodyPr/>
+        <a:lstStyle/>
+        <a:p>
+          <a:endParaRPr lang="en-US"/>
+        </a:p>
+      </dgm:t>
+    </dgm:pt>
+    <dgm:pt modelId="{B5296A22-834E-4838-AE85-7E35C90A93D5}">
+      <dgm:prSet phldrT="[Text]"/>
+      <dgm:spPr/>
+      <dgm:t>
+        <a:bodyPr/>
+        <a:lstStyle/>
+        <a:p>
+          <a:r>
+            <a:rPr lang="en-US" dirty="0"/>
+            <a:t>Controller</a:t>
+          </a:r>
+        </a:p>
+      </dgm:t>
+    </dgm:pt>
+    <dgm:pt modelId="{23580373-2D64-46BF-8B97-98ABFE08C511}" type="parTrans" cxnId="{6DAD719E-6E77-4BC4-A56C-D243E33B2CE7}">
+      <dgm:prSet/>
+      <dgm:spPr/>
+      <dgm:t>
+        <a:bodyPr/>
+        <a:lstStyle/>
+        <a:p>
+          <a:endParaRPr lang="en-US"/>
+        </a:p>
+      </dgm:t>
+    </dgm:pt>
+    <dgm:pt modelId="{33260297-13BD-438A-A660-0918A3C159FD}" type="sibTrans" cxnId="{6DAD719E-6E77-4BC4-A56C-D243E33B2CE7}">
+      <dgm:prSet/>
+      <dgm:spPr/>
+      <dgm:t>
+        <a:bodyPr/>
+        <a:lstStyle/>
+        <a:p>
+          <a:endParaRPr lang="en-US"/>
+        </a:p>
+      </dgm:t>
+    </dgm:pt>
+    <dgm:pt modelId="{7EED9990-EDA7-41B0-9779-05BF50CCB4FF}" type="pres">
+      <dgm:prSet presAssocID="{48C1D273-D682-46A5-9B06-68A46861FEF0}" presName="diagram" presStyleCnt="0">
+        <dgm:presLayoutVars>
+          <dgm:dir/>
+          <dgm:resizeHandles val="exact"/>
+        </dgm:presLayoutVars>
+      </dgm:prSet>
+      <dgm:spPr/>
+    </dgm:pt>
+    <dgm:pt modelId="{E36C9D28-9933-4B36-8DDE-60F4B28C1AA5}" type="pres">
+      <dgm:prSet presAssocID="{C776C2D1-2FE4-436E-A7C6-13145062826B}" presName="node" presStyleLbl="node1" presStyleIdx="0" presStyleCnt="3" custScaleX="14264" custScaleY="4991" custLinFactNeighborX="17110" custLinFactNeighborY="-42814">
+        <dgm:presLayoutVars>
+          <dgm:bulletEnabled val="1"/>
+        </dgm:presLayoutVars>
+      </dgm:prSet>
+      <dgm:spPr/>
+    </dgm:pt>
+    <dgm:pt modelId="{827CB376-47D5-4A64-BE27-EABE463926E0}" type="pres">
+      <dgm:prSet presAssocID="{86F574C6-32E6-48FB-B48F-BE6A1757C303}" presName="sibTrans" presStyleCnt="0"/>
+      <dgm:spPr/>
+    </dgm:pt>
+    <dgm:pt modelId="{9EA212FF-F77F-4420-88CE-E9D7567A907A}" type="pres">
+      <dgm:prSet presAssocID="{BEC230AA-7543-4CE1-B7D4-85C1B9660BFE}" presName="node" presStyleLbl="node1" presStyleIdx="1" presStyleCnt="3" custScaleX="8297" custScaleY="4889" custLinFactNeighborX="-42317" custLinFactNeighborY="5536">
+        <dgm:presLayoutVars>
+          <dgm:bulletEnabled val="1"/>
+        </dgm:presLayoutVars>
+      </dgm:prSet>
+      <dgm:spPr/>
+    </dgm:pt>
+    <dgm:pt modelId="{ECBF8CF8-DA4A-47C9-A414-B6008772EDE6}" type="pres">
+      <dgm:prSet presAssocID="{EC0540FD-F3DB-4785-9684-60BC0B1326C9}" presName="sibTrans" presStyleCnt="0"/>
+      <dgm:spPr/>
+    </dgm:pt>
+    <dgm:pt modelId="{54CD3B95-3ED1-44AA-A73D-9D0CF9B6E378}" type="pres">
+      <dgm:prSet presAssocID="{B5296A22-834E-4838-AE85-7E35C90A93D5}" presName="node" presStyleLbl="node1" presStyleIdx="2" presStyleCnt="3" custScaleX="12549" custScaleY="4942" custLinFactNeighborX="7803" custLinFactNeighborY="4705">
+        <dgm:presLayoutVars>
+          <dgm:bulletEnabled val="1"/>
+        </dgm:presLayoutVars>
+      </dgm:prSet>
+      <dgm:spPr/>
+    </dgm:pt>
+  </dgm:ptLst>
+  <dgm:cxnLst>
+    <dgm:cxn modelId="{15006456-A743-48BA-9427-B44923B8E497}" type="presOf" srcId="{BEC230AA-7543-4CE1-B7D4-85C1B9660BFE}" destId="{9EA212FF-F77F-4420-88CE-E9D7567A907A}" srcOrd="0" destOrd="0" presId="urn:microsoft.com/office/officeart/2005/8/layout/default"/>
+    <dgm:cxn modelId="{2602E493-A8A4-4D15-B20F-A6425241B836}" srcId="{48C1D273-D682-46A5-9B06-68A46861FEF0}" destId="{BEC230AA-7543-4CE1-B7D4-85C1B9660BFE}" srcOrd="1" destOrd="0" parTransId="{E97394F5-529A-4808-B7B7-A515A15479D8}" sibTransId="{EC0540FD-F3DB-4785-9684-60BC0B1326C9}"/>
+    <dgm:cxn modelId="{6DAD719E-6E77-4BC4-A56C-D243E33B2CE7}" srcId="{48C1D273-D682-46A5-9B06-68A46861FEF0}" destId="{B5296A22-834E-4838-AE85-7E35C90A93D5}" srcOrd="2" destOrd="0" parTransId="{23580373-2D64-46BF-8B97-98ABFE08C511}" sibTransId="{33260297-13BD-438A-A660-0918A3C159FD}"/>
+    <dgm:cxn modelId="{C8B407A8-F139-447F-AA24-9C1EEBF579EF}" type="presOf" srcId="{B5296A22-834E-4838-AE85-7E35C90A93D5}" destId="{54CD3B95-3ED1-44AA-A73D-9D0CF9B6E378}" srcOrd="0" destOrd="0" presId="urn:microsoft.com/office/officeart/2005/8/layout/default"/>
+    <dgm:cxn modelId="{1ECE66AE-7A6B-489C-AAF3-D0B7BFE6FD4E}" srcId="{48C1D273-D682-46A5-9B06-68A46861FEF0}" destId="{C776C2D1-2FE4-436E-A7C6-13145062826B}" srcOrd="0" destOrd="0" parTransId="{548C42B6-3C90-403C-AFAA-7CFA35ED8F06}" sibTransId="{86F574C6-32E6-48FB-B48F-BE6A1757C303}"/>
+    <dgm:cxn modelId="{3C2A33F3-A896-4900-A1B4-473A31CB64AF}" type="presOf" srcId="{48C1D273-D682-46A5-9B06-68A46861FEF0}" destId="{7EED9990-EDA7-41B0-9779-05BF50CCB4FF}" srcOrd="0" destOrd="0" presId="urn:microsoft.com/office/officeart/2005/8/layout/default"/>
+    <dgm:cxn modelId="{971FF6FC-B051-4AFE-A97A-D1459389E63F}" type="presOf" srcId="{C776C2D1-2FE4-436E-A7C6-13145062826B}" destId="{E36C9D28-9933-4B36-8DDE-60F4B28C1AA5}" srcOrd="0" destOrd="0" presId="urn:microsoft.com/office/officeart/2005/8/layout/default"/>
+    <dgm:cxn modelId="{8AD8073C-9FA5-46F1-97CE-BD794E948B89}" type="presParOf" srcId="{7EED9990-EDA7-41B0-9779-05BF50CCB4FF}" destId="{E36C9D28-9933-4B36-8DDE-60F4B28C1AA5}" srcOrd="0" destOrd="0" presId="urn:microsoft.com/office/officeart/2005/8/layout/default"/>
+    <dgm:cxn modelId="{F103DB61-07AA-41CC-AB8C-2408F63AF631}" type="presParOf" srcId="{7EED9990-EDA7-41B0-9779-05BF50CCB4FF}" destId="{827CB376-47D5-4A64-BE27-EABE463926E0}" srcOrd="1" destOrd="0" presId="urn:microsoft.com/office/officeart/2005/8/layout/default"/>
+    <dgm:cxn modelId="{54BAEB2B-3A37-4911-ABC3-35C9654DC59A}" type="presParOf" srcId="{7EED9990-EDA7-41B0-9779-05BF50CCB4FF}" destId="{9EA212FF-F77F-4420-88CE-E9D7567A907A}" srcOrd="2" destOrd="0" presId="urn:microsoft.com/office/officeart/2005/8/layout/default"/>
+    <dgm:cxn modelId="{638155F4-A34A-4A50-B00B-E995B3648839}" type="presParOf" srcId="{7EED9990-EDA7-41B0-9779-05BF50CCB4FF}" destId="{ECBF8CF8-DA4A-47C9-A414-B6008772EDE6}" srcOrd="3" destOrd="0" presId="urn:microsoft.com/office/officeart/2005/8/layout/default"/>
+    <dgm:cxn modelId="{1FAC5EA5-DC08-4E00-8605-2081C99326C8}" type="presParOf" srcId="{7EED9990-EDA7-41B0-9779-05BF50CCB4FF}" destId="{54CD3B95-3ED1-44AA-A73D-9D0CF9B6E378}" srcOrd="4" destOrd="0" presId="urn:microsoft.com/office/officeart/2005/8/layout/default"/>
+  </dgm:cxnLst>
+  <dgm:bg/>
+  <dgm:whole/>
+  <dgm:extLst>
+    <a:ext uri="http://schemas.microsoft.com/office/drawing/2008/diagram">
+      <dsp:dataModelExt xmlns:dsp="http://schemas.microsoft.com/office/drawing/2008/diagram" relId="rId7" minVer="http://schemas.openxmlformats.org/drawingml/2006/diagram"/>
+    </a:ext>
+  </dgm:extLst>
+</dgm:dataModel>
+</file>
+
+<file path=ppt/diagrams/drawing1.xml><?xml version="1.0" encoding="utf-8"?>
+<dsp:drawing xmlns:dgm="http://schemas.openxmlformats.org/drawingml/2006/diagram" xmlns:dsp="http://schemas.microsoft.com/office/drawing/2008/diagram" xmlns:a="http://schemas.openxmlformats.org/drawingml/2006/main">
+  <dsp:spTree>
+    <dsp:nvGrpSpPr>
+      <dsp:cNvPr id="0" name=""/>
+      <dsp:cNvGrpSpPr/>
+    </dsp:nvGrpSpPr>
+    <dsp:grpSpPr/>
+    <dsp:sp modelId="{E36C9D28-9933-4B36-8DDE-60F4B28C1AA5}">
+      <dsp:nvSpPr>
+        <dsp:cNvPr id="0" name=""/>
+        <dsp:cNvSpPr/>
+      </dsp:nvSpPr>
+      <dsp:spPr>
+        <a:xfrm>
+          <a:off x="3822079" y="48148"/>
+          <a:ext cx="1378286" cy="289359"/>
+        </a:xfrm>
+        <a:prstGeom prst="rect">
+          <a:avLst/>
+        </a:prstGeom>
+        <a:solidFill>
+          <a:schemeClr val="accent1">
+            <a:hueOff val="0"/>
+            <a:satOff val="0"/>
+            <a:lumOff val="0"/>
+            <a:alphaOff val="0"/>
+          </a:schemeClr>
+        </a:solidFill>
+        <a:ln w="12700" cap="flat" cmpd="sng" algn="ctr">
+          <a:solidFill>
+            <a:schemeClr val="lt1">
+              <a:hueOff val="0"/>
+              <a:satOff val="0"/>
+              <a:lumOff val="0"/>
+              <a:alphaOff val="0"/>
+            </a:schemeClr>
+          </a:solidFill>
+          <a:prstDash val="solid"/>
+        </a:ln>
+        <a:effectLst/>
+      </dsp:spPr>
+      <dsp:style>
+        <a:lnRef idx="2">
+          <a:scrgbClr r="0" g="0" b="0"/>
+        </a:lnRef>
+        <a:fillRef idx="1">
+          <a:scrgbClr r="0" g="0" b="0"/>
+        </a:fillRef>
+        <a:effectRef idx="0">
+          <a:scrgbClr r="0" g="0" b="0"/>
+        </a:effectRef>
+        <a:fontRef idx="minor">
+          <a:schemeClr val="lt1"/>
+        </a:fontRef>
+      </dsp:style>
+      <dsp:txBody>
+        <a:bodyPr spcFirstLastPara="0" vert="horz" wrap="square" lIns="49530" tIns="49530" rIns="49530" bIns="49530" numCol="1" spcCol="1270" anchor="ctr" anchorCtr="0">
+          <a:noAutofit/>
+        </a:bodyPr>
+        <a:lstStyle/>
+        <a:p>
+          <a:pPr marL="0" lvl="0" indent="0" algn="ctr" defTabSz="577850">
+            <a:lnSpc>
+              <a:spcPct val="90000"/>
+            </a:lnSpc>
+            <a:spcBef>
+              <a:spcPct val="0"/>
+            </a:spcBef>
+            <a:spcAft>
+              <a:spcPct val="35000"/>
+            </a:spcAft>
+            <a:buNone/>
+          </a:pPr>
+          <a:r>
+            <a:rPr lang="en-US" sz="1300" kern="1200" dirty="0"/>
+            <a:t>Model</a:t>
+          </a:r>
+        </a:p>
+      </dsp:txBody>
+      <dsp:txXfrm>
+        <a:off x="3822079" y="48148"/>
+        <a:ext cx="1378286" cy="289359"/>
+      </dsp:txXfrm>
+    </dsp:sp>
+    <dsp:sp modelId="{9EA212FF-F77F-4420-88CE-E9D7567A907A}">
+      <dsp:nvSpPr>
+        <dsp:cNvPr id="0" name=""/>
+        <dsp:cNvSpPr/>
+      </dsp:nvSpPr>
+      <dsp:spPr>
+        <a:xfrm>
+          <a:off x="424385" y="2854253"/>
+          <a:ext cx="801713" cy="283445"/>
+        </a:xfrm>
+        <a:prstGeom prst="rect">
+          <a:avLst/>
+        </a:prstGeom>
+        <a:solidFill>
+          <a:schemeClr val="accent1">
+            <a:hueOff val="0"/>
+            <a:satOff val="0"/>
+            <a:lumOff val="0"/>
+            <a:alphaOff val="0"/>
+          </a:schemeClr>
+        </a:solidFill>
+        <a:ln w="12700" cap="flat" cmpd="sng" algn="ctr">
+          <a:solidFill>
+            <a:schemeClr val="lt1">
+              <a:hueOff val="0"/>
+              <a:satOff val="0"/>
+              <a:lumOff val="0"/>
+              <a:alphaOff val="0"/>
+            </a:schemeClr>
+          </a:solidFill>
+          <a:prstDash val="solid"/>
+        </a:ln>
+        <a:effectLst/>
+      </dsp:spPr>
+      <dsp:style>
+        <a:lnRef idx="2">
+          <a:scrgbClr r="0" g="0" b="0"/>
+        </a:lnRef>
+        <a:fillRef idx="1">
+          <a:scrgbClr r="0" g="0" b="0"/>
+        </a:fillRef>
+        <a:effectRef idx="0">
+          <a:scrgbClr r="0" g="0" b="0"/>
+        </a:effectRef>
+        <a:fontRef idx="minor">
+          <a:schemeClr val="lt1"/>
+        </a:fontRef>
+      </dsp:style>
+      <dsp:txBody>
+        <a:bodyPr spcFirstLastPara="0" vert="horz" wrap="square" lIns="49530" tIns="49530" rIns="49530" bIns="49530" numCol="1" spcCol="1270" anchor="ctr" anchorCtr="0">
+          <a:noAutofit/>
+        </a:bodyPr>
+        <a:lstStyle/>
+        <a:p>
+          <a:pPr marL="0" lvl="0" indent="0" algn="ctr" defTabSz="577850">
+            <a:lnSpc>
+              <a:spcPct val="90000"/>
+            </a:lnSpc>
+            <a:spcBef>
+              <a:spcPct val="0"/>
+            </a:spcBef>
+            <a:spcAft>
+              <a:spcPct val="35000"/>
+            </a:spcAft>
+            <a:buNone/>
+          </a:pPr>
+          <a:r>
+            <a:rPr lang="en-US" sz="1300" kern="1200" dirty="0"/>
+            <a:t>View</a:t>
+          </a:r>
+        </a:p>
+      </dsp:txBody>
+      <dsp:txXfrm>
+        <a:off x="424385" y="2854253"/>
+        <a:ext cx="801713" cy="283445"/>
+      </dsp:txXfrm>
+    </dsp:sp>
+    <dsp:sp modelId="{54CD3B95-3ED1-44AA-A73D-9D0CF9B6E378}">
+      <dsp:nvSpPr>
+        <dsp:cNvPr id="0" name=""/>
+        <dsp:cNvSpPr/>
+      </dsp:nvSpPr>
+      <dsp:spPr>
+        <a:xfrm>
+          <a:off x="7035311" y="2804538"/>
+          <a:ext cx="1212571" cy="286518"/>
+        </a:xfrm>
+        <a:prstGeom prst="rect">
+          <a:avLst/>
+        </a:prstGeom>
+        <a:solidFill>
+          <a:schemeClr val="accent1">
+            <a:hueOff val="0"/>
+            <a:satOff val="0"/>
+            <a:lumOff val="0"/>
+            <a:alphaOff val="0"/>
+          </a:schemeClr>
+        </a:solidFill>
+        <a:ln w="12700" cap="flat" cmpd="sng" algn="ctr">
+          <a:solidFill>
+            <a:schemeClr val="lt1">
+              <a:hueOff val="0"/>
+              <a:satOff val="0"/>
+              <a:lumOff val="0"/>
+              <a:alphaOff val="0"/>
+            </a:schemeClr>
+          </a:solidFill>
+          <a:prstDash val="solid"/>
+        </a:ln>
+        <a:effectLst/>
+      </dsp:spPr>
+      <dsp:style>
+        <a:lnRef idx="2">
+          <a:scrgbClr r="0" g="0" b="0"/>
+        </a:lnRef>
+        <a:fillRef idx="1">
+          <a:scrgbClr r="0" g="0" b="0"/>
+        </a:fillRef>
+        <a:effectRef idx="0">
+          <a:scrgbClr r="0" g="0" b="0"/>
+        </a:effectRef>
+        <a:fontRef idx="minor">
+          <a:schemeClr val="lt1"/>
+        </a:fontRef>
+      </dsp:style>
+      <dsp:txBody>
+        <a:bodyPr spcFirstLastPara="0" vert="horz" wrap="square" lIns="49530" tIns="49530" rIns="49530" bIns="49530" numCol="1" spcCol="1270" anchor="ctr" anchorCtr="0">
+          <a:noAutofit/>
+        </a:bodyPr>
+        <a:lstStyle/>
+        <a:p>
+          <a:pPr marL="0" lvl="0" indent="0" algn="ctr" defTabSz="577850">
+            <a:lnSpc>
+              <a:spcPct val="90000"/>
+            </a:lnSpc>
+            <a:spcBef>
+              <a:spcPct val="0"/>
+            </a:spcBef>
+            <a:spcAft>
+              <a:spcPct val="35000"/>
+            </a:spcAft>
+            <a:buNone/>
+          </a:pPr>
+          <a:r>
+            <a:rPr lang="en-US" sz="1300" kern="1200" dirty="0"/>
+            <a:t>Controller</a:t>
+          </a:r>
+        </a:p>
+      </dsp:txBody>
+      <dsp:txXfrm>
+        <a:off x="7035311" y="2804538"/>
+        <a:ext cx="1212571" cy="286518"/>
+      </dsp:txXfrm>
+    </dsp:sp>
+  </dsp:spTree>
+</dsp:drawing>
+</file>
+
+<file path=ppt/diagrams/layout1.xml><?xml version="1.0" encoding="utf-8"?>
+<dgm:layoutDef xmlns:dgm="http://schemas.openxmlformats.org/drawingml/2006/diagram" xmlns:a="http://schemas.openxmlformats.org/drawingml/2006/main" uniqueId="urn:microsoft.com/office/officeart/2005/8/layout/default">
+  <dgm:title val=""/>
+  <dgm:desc val=""/>
+  <dgm:catLst>
+    <dgm:cat type="list" pri="400"/>
+  </dgm:catLst>
+  <dgm:sampData>
+    <dgm:dataModel>
+      <dgm:ptLst>
+        <dgm:pt modelId="0" type="doc"/>
+        <dgm:pt modelId="1">
+          <dgm:prSet phldr="1"/>
+        </dgm:pt>
+        <dgm:pt modelId="2">
+          <dgm:prSet phldr="1"/>
+        </dgm:pt>
+        <dgm:pt modelId="3">
+          <dgm:prSet phldr="1"/>
+        </dgm:pt>
+        <dgm:pt modelId="4">
+          <dgm:prSet phldr="1"/>
+        </dgm:pt>
+        <dgm:pt modelId="5">
+          <dgm:prSet phldr="1"/>
+        </dgm:pt>
+      </dgm:ptLst>
+      <dgm:cxnLst>
+        <dgm:cxn modelId="6" srcId="0" destId="1" srcOrd="0" destOrd="0"/>
+        <dgm:cxn modelId="7" srcId="0" destId="2" srcOrd="1" destOrd="0"/>
+        <dgm:cxn modelId="8" srcId="0" destId="3" srcOrd="2" destOrd="0"/>
+        <dgm:cxn modelId="9" srcId="0" destId="4" srcOrd="3" destOrd="0"/>
+        <dgm:cxn modelId="10" srcId="0" destId="5" srcOrd="4" destOrd="0"/>
+      </dgm:cxnLst>
+      <dgm:bg/>
+      <dgm:whole/>
+    </dgm:dataModel>
+  </dgm:sampData>
+  <dgm:styleData>
+    <dgm:dataModel>
+      <dgm:ptLst>
+        <dgm:pt modelId="0" type="doc"/>
+        <dgm:pt modelId="1"/>
+        <dgm:pt modelId="2"/>
+      </dgm:ptLst>
+      <dgm:cxnLst>
+        <dgm:cxn modelId="3" srcId="0" destId="1" srcOrd="0" destOrd="0"/>
+        <dgm:cxn modelId="4" srcId="0" destId="2" srcOrd="1" destOrd="0"/>
+      </dgm:cxnLst>
+      <dgm:bg/>
+      <dgm:whole/>
+    </dgm:dataModel>
+  </dgm:styleData>
+  <dgm:clrData>
+    <dgm:dataModel>
+      <dgm:ptLst>
+        <dgm:pt modelId="0" type="doc"/>
+        <dgm:pt modelId="1"/>
+        <dgm:pt modelId="2"/>
+        <dgm:pt modelId="3"/>
+        <dgm:pt modelId="4"/>
+        <dgm:pt modelId="5"/>
+        <dgm:pt modelId="6"/>
+      </dgm:ptLst>
+      <dgm:cxnLst>
+        <dgm:cxn modelId="7" srcId="0" destId="1" srcOrd="0" destOrd="0"/>
+        <dgm:cxn modelId="8" srcId="0" destId="2" srcOrd="1" destOrd="0"/>
+        <dgm:cxn modelId="9" srcId="0" destId="3" srcOrd="2" destOrd="0"/>
+        <dgm:cxn modelId="10" srcId="0" destId="4" srcOrd="3" destOrd="0"/>
+        <dgm:cxn modelId="11" srcId="0" destId="5" srcOrd="4" destOrd="0"/>
+        <dgm:cxn modelId="12" srcId="0" destId="6" srcOrd="5" destOrd="0"/>
+      </dgm:cxnLst>
+      <dgm:bg/>
+      <dgm:whole/>
+    </dgm:dataModel>
+  </dgm:clrData>
+  <dgm:layoutNode name="diagram">
+    <dgm:varLst>
+      <dgm:dir/>
+      <dgm:resizeHandles val="exact"/>
+    </dgm:varLst>
+    <dgm:choose name="Name0">
+      <dgm:if name="Name1" func="var" arg="dir" op="equ" val="norm">
+        <dgm:alg type="snake">
+          <dgm:param type="grDir" val="tL"/>
+          <dgm:param type="flowDir" val="row"/>
+          <dgm:param type="contDir" val="sameDir"/>
+          <dgm:param type="off" val="ctr"/>
+        </dgm:alg>
+      </dgm:if>
+      <dgm:else name="Name2">
+        <dgm:alg type="snake">
+          <dgm:param type="grDir" val="tR"/>
+          <dgm:param type="flowDir" val="row"/>
+          <dgm:param type="contDir" val="sameDir"/>
+          <dgm:param type="off" val="ctr"/>
+        </dgm:alg>
+      </dgm:else>
+    </dgm:choose>
+    <dgm:shape xmlns:r="http://schemas.openxmlformats.org/officeDocument/2006/relationships" r:blip="">
+      <dgm:adjLst/>
+    </dgm:shape>
+    <dgm:presOf/>
+    <dgm:constrLst>
+      <dgm:constr type="w" for="ch" forName="node" refType="w"/>
+      <dgm:constr type="h" for="ch" forName="node" refType="w" refFor="ch" refForName="node" fact="0.6"/>
+      <dgm:constr type="w" for="ch" forName="sibTrans" refType="w" refFor="ch" refForName="node" fact="0.1"/>
+      <dgm:constr type="sp" refType="w" refFor="ch" refForName="sibTrans"/>
+      <dgm:constr type="primFontSz" for="ch" forName="node" op="equ" val="65"/>
+    </dgm:constrLst>
+    <dgm:ruleLst/>
+    <dgm:forEach name="Name3" axis="ch" ptType="node">
+      <dgm:layoutNode name="node">
+        <dgm:varLst>
+          <dgm:bulletEnabled val="1"/>
+        </dgm:varLst>
+        <dgm:alg type="tx"/>
+        <dgm:shape xmlns:r="http://schemas.openxmlformats.org/officeDocument/2006/relationships" type="rect" r:blip="">
+          <dgm:adjLst/>
+        </dgm:shape>
+        <dgm:presOf axis="desOrSelf" ptType="node"/>
+        <dgm:constrLst>
+          <dgm:constr type="lMarg" refType="primFontSz" fact="0.3"/>
+          <dgm:constr type="rMarg" refType="primFontSz" fact="0.3"/>
+          <dgm:constr type="tMarg" refType="primFontSz" fact="0.3"/>
+          <dgm:constr type="bMarg" refType="primFontSz" fact="0.3"/>
+        </dgm:constrLst>
+        <dgm:ruleLst>
+          <dgm:rule type="primFontSz" val="5" fact="NaN" max="NaN"/>
+        </dgm:ruleLst>
+      </dgm:layoutNode>
+      <dgm:forEach name="Name4" axis="followSib" ptType="sibTrans" cnt="1">
+        <dgm:layoutNode name="sibTrans">
+          <dgm:alg type="sp"/>
+          <dgm:shape xmlns:r="http://schemas.openxmlformats.org/officeDocument/2006/relationships" r:blip="">
+            <dgm:adjLst/>
+          </dgm:shape>
+          <dgm:presOf/>
+          <dgm:constrLst/>
+          <dgm:ruleLst/>
+        </dgm:layoutNode>
+      </dgm:forEach>
+    </dgm:forEach>
+  </dgm:layoutNode>
+</dgm:layoutDef>
+</file>
+
+<file path=ppt/diagrams/quickStyle1.xml><?xml version="1.0" encoding="utf-8"?>
+<dgm:styleDef xmlns:dgm="http://schemas.openxmlformats.org/drawingml/2006/diagram" xmlns:a="http://schemas.openxmlformats.org/drawingml/2006/main" uniqueId="urn:microsoft.com/office/officeart/2005/8/quickstyle/simple1">
+  <dgm:title val=""/>
+  <dgm:desc val=""/>
+  <dgm:catLst>
+    <dgm:cat type="simple" pri="10100"/>
+  </dgm:catLst>
+  <dgm:scene3d>
+    <a:camera prst="orthographicFront"/>
+    <a:lightRig rig="threePt" dir="t"/>
+  </dgm:scene3d>
+  <dgm:styleLbl name="node0">
+    <dgm:scene3d>
+      <a:camera prst="orthographicFront"/>
+      <a:lightRig rig="threePt" dir="t"/>
+    </dgm:scene3d>
+    <dgm:sp3d/>
+    <dgm:txPr/>
+    <dgm:style>
+      <a:lnRef idx="2">
+        <a:scrgbClr r="0" g="0" b="0"/>
+      </a:lnRef>
+      <a:fillRef idx="1">
+        <a:scrgbClr r="0" g="0" b="0"/>
+      </a:fillRef>
+      <a:effectRef idx="0">
+        <a:scrgbClr r="0" g="0" b="0"/>
+      </a:effectRef>
+      <a:fontRef idx="minor">
+        <a:schemeClr val="lt1"/>
+      </a:fontRef>
+    </dgm:style>
+  </dgm:styleLbl>
+  <dgm:styleLbl name="lnNode1">
+    <dgm:scene3d>
+      <a:camera prst="orthographicFront"/>
+      <a:lightRig rig="threePt" dir="t"/>
+    </dgm:scene3d>
+    <dgm:sp3d/>
+    <dgm:txPr/>
+    <dgm:style>
+      <a:lnRef idx="2">
+        <a:scrgbClr r="0" g="0" b="0"/>
+      </a:lnRef>
+      <a:fillRef idx="1">
+        <a:scrgbClr r="0" g="0" b="0"/>
+      </a:fillRef>
+      <a:effectRef idx="0">
+        <a:scrgbClr r="0" g="0" b="0"/>
+      </a:effectRef>
+      <a:fontRef idx="minor">
+        <a:schemeClr val="lt1"/>
+      </a:fontRef>
+    </dgm:style>
+  </dgm:styleLbl>
+  <dgm:styleLbl name="vennNode1">
+    <dgm:scene3d>
+      <a:camera prst="orthographicFront"/>
+      <a:lightRig rig="threePt" dir="t"/>
+    </dgm:scene3d>
+    <dgm:sp3d/>
+    <dgm:txPr/>
+    <dgm:style>
+      <a:lnRef idx="2">
+        <a:scrgbClr r="0" g="0" b="0"/>
+      </a:lnRef>
+      <a:fillRef idx="1">
+        <a:scrgbClr r="0" g="0" b="0"/>
+      </a:fillRef>
+      <a:effectRef idx="0">
+        <a:scrgbClr r="0" g="0" b="0"/>
+      </a:effectRef>
+      <a:fontRef idx="minor">
+        <a:schemeClr val="tx1"/>
+      </a:fontRef>
+    </dgm:style>
+  </dgm:styleLbl>
+  <dgm:styleLbl name="alignNode1">
+    <dgm:scene3d>
+      <a:camera prst="orthographicFront"/>
+      <a:lightRig rig="threePt" dir="t"/>
+    </dgm:scene3d>
+    <dgm:sp3d/>
+    <dgm:txPr/>
+    <dgm:style>
+      <a:lnRef idx="2">
+        <a:scrgbClr r="0" g="0" b="0"/>
+      </a:lnRef>
+      <a:fillRef idx="1">
+        <a:scrgbClr r="0" g="0" b="0"/>
+      </a:fillRef>
+      <a:effectRef idx="0">
+        <a:scrgbClr r="0" g="0" b="0"/>
+      </a:effectRef>
+      <a:fontRef idx="minor">
+        <a:schemeClr val="lt1"/>
+      </a:fontRef>
+    </dgm:style>
+  </dgm:styleLbl>
+  <dgm:styleLbl name="node1">
+    <dgm:scene3d>
+      <a:camera prst="orthographicFront"/>
+      <a:lightRig rig="threePt" dir="t"/>
+    </dgm:scene3d>
+    <dgm:sp3d/>
+    <dgm:txPr/>
+    <dgm:style>
+      <a:lnRef idx="2">
+        <a:scrgbClr r="0" g="0" b="0"/>
+      </a:lnRef>
+      <a:fillRef idx="1">
+        <a:scrgbClr r="0" g="0" b="0"/>
+      </a:fillRef>
+      <a:effectRef idx="0">
+        <a:scrgbClr r="0" g="0" b="0"/>
+      </a:effectRef>
+      <a:fontRef idx="minor">
+        <a:schemeClr val="lt1"/>
+      </a:fontRef>
+    </dgm:style>
+  </dgm:styleLbl>
+  <dgm:styleLbl name="node2">
+    <dgm:scene3d>
+      <a:camera prst="orthographicFront"/>
+      <a:lightRig rig="threePt" dir="t"/>
+    </dgm:scene3d>
+    <dgm:sp3d/>
+    <dgm:txPr/>
+    <dgm:style>
+      <a:lnRef idx="2">
+        <a:scrgbClr r="0" g="0" b="0"/>
+      </a:lnRef>
+      <a:fillRef idx="1">
+        <a:scrgbClr r="0" g="0" b="0"/>
+      </a:fillRef>
+      <a:effectRef idx="0">
+        <a:scrgbClr r="0" g="0" b="0"/>
+      </a:effectRef>
+      <a:fontRef idx="minor">
+        <a:schemeClr val="lt1"/>
+      </a:fontRef>
+    </dgm:style>
+  </dgm:styleLbl>
+  <dgm:styleLbl name="node3">
+    <dgm:scene3d>
+      <a:camera prst="orthographicFront"/>
+      <a:lightRig rig="threePt" dir="t"/>
+    </dgm:scene3d>
+    <dgm:sp3d/>
+    <dgm:txPr/>
+    <dgm:style>
+      <a:lnRef idx="2">
+        <a:scrgbClr r="0" g="0" b="0"/>
+      </a:lnRef>
+      <a:fillRef idx="1">
+        <a:scrgbClr r="0" g="0" b="0"/>
+      </a:fillRef>
+      <a:effectRef idx="0">
+        <a:scrgbClr r="0" g="0" b="0"/>
+      </a:effectRef>
+      <a:fontRef idx="minor">
+        <a:schemeClr val="lt1"/>
+      </a:fontRef>
+    </dgm:style>
+  </dgm:styleLbl>
+  <dgm:styleLbl name="node4">
+    <dgm:scene3d>
+      <a:camera prst="orthographicFront"/>
+      <a:lightRig rig="threePt" dir="t"/>
+    </dgm:scene3d>
+    <dgm:sp3d/>
+    <dgm:txPr/>
+    <dgm:style>
+      <a:lnRef idx="2">
+        <a:scrgbClr r="0" g="0" b="0"/>
+      </a:lnRef>
+      <a:fillRef idx="1">
+        <a:scrgbClr r="0" g="0" b="0"/>
+      </a:fillRef>
+      <a:effectRef idx="0">
+        <a:scrgbClr r="0" g="0" b="0"/>
+      </a:effectRef>
+      <a:fontRef idx="minor">
+        <a:schemeClr val="lt1"/>
+      </a:fontRef>
+    </dgm:style>
+  </dgm:styleLbl>
+  <dgm:styleLbl name="fgImgPlace1">
+    <dgm:scene3d>
+      <a:camera prst="orthographicFront"/>
+      <a:lightRig rig="threePt" dir="t"/>
+    </dgm:scene3d>
+    <dgm:sp3d/>
+    <dgm:txPr/>
+    <dgm:style>
+      <a:lnRef idx="2">
+        <a:scrgbClr r="0" g="0" b="0"/>
+      </a:lnRef>
+      <a:fillRef idx="1">
+        <a:scrgbClr r="0" g="0" b="0"/>
+      </a:fillRef>
+      <a:effectRef idx="0">
+        <a:scrgbClr r="0" g="0" b="0"/>
+      </a:effectRef>
+      <a:fontRef idx="minor"/>
+    </dgm:style>
+  </dgm:styleLbl>
+  <dgm:styleLbl name="alignImgPlace1">
+    <dgm:scene3d>
+      <a:camera prst="orthographicFront"/>
+      <a:lightRig rig="threePt" dir="t"/>
+    </dgm:scene3d>
+    <dgm:sp3d/>
+    <dgm:txPr/>
+    <dgm:style>
+      <a:lnRef idx="2">
+        <a:scrgbClr r="0" g="0" b="0"/>
+      </a:lnRef>
+      <a:fillRef idx="1">
+        <a:scrgbClr r="0" g="0" b="0"/>
+      </a:fillRef>
+      <a:effectRef idx="0">
+        <a:scrgbClr r="0" g="0" b="0"/>
+      </a:effectRef>
+      <a:fontRef idx="minor"/>
+    </dgm:style>
+  </dgm:styleLbl>
+  <dgm:styleLbl name="bgImgPlace1">
+    <dgm:scene3d>
+      <a:camera prst="orthographicFront"/>
+      <a:lightRig rig="threePt" dir="t"/>
+    </dgm:scene3d>
+    <dgm:sp3d/>
+    <dgm:txPr/>
+    <dgm:style>
+      <a:lnRef idx="2">
+        <a:scrgbClr r="0" g="0" b="0"/>
+      </a:lnRef>
+      <a:fillRef idx="1">
+        <a:scrgbClr r="0" g="0" b="0"/>
+      </a:fillRef>
+      <a:effectRef idx="0">
+        <a:scrgbClr r="0" g="0" b="0"/>
+      </a:effectRef>
+      <a:fontRef idx="minor"/>
+    </dgm:style>
+  </dgm:styleLbl>
+  <dgm:styleLbl name="sibTrans2D1">
+    <dgm:scene3d>
+      <a:camera prst="orthographicFront"/>
+      <a:lightRig rig="threePt" dir="t"/>
+    </dgm:scene3d>
+    <dgm:sp3d/>
+    <dgm:txPr/>
+    <dgm:style>
+      <a:lnRef idx="0">
+        <a:scrgbClr r="0" g="0" b="0"/>
+      </a:lnRef>
+      <a:fillRef idx="1">
+        <a:scrgbClr r="0" g="0" b="0"/>
+      </a:fillRef>
+      <a:effectRef idx="0">
+        <a:scrgbClr r="0" g="0" b="0"/>
+      </a:effectRef>
+      <a:fontRef idx="minor">
+        <a:schemeClr val="lt1"/>
+      </a:fontRef>
+    </dgm:style>
+  </dgm:styleLbl>
+  <dgm:styleLbl name="fgSibTrans2D1">
+    <dgm:scene3d>
+      <a:camera prst="orthographicFront"/>
+      <a:lightRig rig="threePt" dir="t"/>
+    </dgm:scene3d>
+    <dgm:sp3d/>
+    <dgm:txPr/>
+    <dgm:style>
+      <a:lnRef idx="0">
+        <a:scrgbClr r="0" g="0" b="0"/>
+      </a:lnRef>
+      <a:fillRef idx="1">
+        <a:scrgbClr r="0" g="0" b="0"/>
+      </a:fillRef>
+      <a:effectRef idx="0">
+        <a:scrgbClr r="0" g="0" b="0"/>
+      </a:effectRef>
+      <a:fontRef idx="minor">
+        <a:schemeClr val="lt1"/>
+      </a:fontRef>
+    </dgm:style>
+  </dgm:styleLbl>
+  <dgm:styleLbl name="bgSibTrans2D1">
+    <dgm:scene3d>
+      <a:camera prst="orthographicFront"/>
+      <a:lightRig rig="threePt" dir="t"/>
+    </dgm:scene3d>
+    <dgm:sp3d/>
+    <dgm:txPr/>
+    <dgm:style>
+      <a:lnRef idx="0">
+        <a:scrgbClr r="0" g="0" b="0"/>
+      </a:lnRef>
+      <a:fillRef idx="1">
+        <a:scrgbClr r="0" g="0" b="0"/>
+      </a:fillRef>
+      <a:effectRef idx="0">
+        <a:scrgbClr r="0" g="0" b="0"/>
+      </a:effectRef>
+      <a:fontRef idx="minor">
+        <a:schemeClr val="lt1"/>
+      </a:fontRef>
+    </dgm:style>
+  </dgm:styleLbl>
+  <dgm:styleLbl name="sibTrans1D1">
+    <dgm:scene3d>
+      <a:camera prst="orthographicFront"/>
+      <a:lightRig rig="threePt" dir="t"/>
+    </dgm:scene3d>
+    <dgm:sp3d/>
+    <dgm:txPr/>
+    <dgm:style>
+      <a:lnRef idx="1">
+        <a:scrgbClr r="0" g="0" b="0"/>
+      </a:lnRef>
+      <a:fillRef idx="0">
+        <a:scrgbClr r="0" g="0" b="0"/>
+      </a:fillRef>
+      <a:effectRef idx="0">
+        <a:scrgbClr r="0" g="0" b="0"/>
+      </a:effectRef>
+      <a:fontRef idx="minor"/>
+    </dgm:style>
+  </dgm:styleLbl>
+  <dgm:styleLbl name="callout">
+    <dgm:scene3d>
+      <a:camera prst="orthographicFront"/>
+      <a:lightRig rig="threePt" dir="t"/>
+    </dgm:scene3d>
+    <dgm:sp3d/>
+    <dgm:txPr/>
+    <dgm:style>
+      <a:lnRef idx="2">
+        <a:scrgbClr r="0" g="0" b="0"/>
+      </a:lnRef>
+      <a:fillRef idx="1">
+        <a:scrgbClr r="0" g="0" b="0"/>
+      </a:fillRef>
+      <a:effectRef idx="0">
+        <a:scrgbClr r="0" g="0" b="0"/>
+      </a:effectRef>
+      <a:fontRef idx="minor"/>
+    </dgm:style>
+  </dgm:styleLbl>
+  <dgm:styleLbl name="asst0">
+    <dgm:scene3d>
+      <a:camera prst="orthographicFront"/>
+      <a:lightRig rig="threePt" dir="t"/>
+    </dgm:scene3d>
+    <dgm:sp3d/>
+    <dgm:txPr/>
+    <dgm:style>
+      <a:lnRef idx="2">
+        <a:scrgbClr r="0" g="0" b="0"/>
+      </a:lnRef>
+      <a:fillRef idx="1">
+        <a:scrgbClr r="0" g="0" b="0"/>
+      </a:fillRef>
+      <a:effectRef idx="0">
+        <a:scrgbClr r="0" g="0" b="0"/>
+      </a:effectRef>
+      <a:fontRef idx="minor">
+        <a:schemeClr val="lt1"/>
+      </a:fontRef>
+    </dgm:style>
+  </dgm:styleLbl>
+  <dgm:styleLbl name="asst1">
+    <dgm:scene3d>
+      <a:camera prst="orthographicFront"/>
+      <a:lightRig rig="threePt" dir="t"/>
+    </dgm:scene3d>
+    <dgm:sp3d/>
+    <dgm:txPr/>
+    <dgm:style>
+      <a:lnRef idx="2">
+        <a:scrgbClr r="0" g="0" b="0"/>
+      </a:lnRef>
+      <a:fillRef idx="1">
+        <a:scrgbClr r="0" g="0" b="0"/>
+      </a:fillRef>
+      <a:effectRef idx="0">
+        <a:scrgbClr r="0" g="0" b="0"/>
+      </a:effectRef>
+      <a:fontRef idx="minor">
+        <a:schemeClr val="lt1"/>
+      </a:fontRef>
+    </dgm:style>
+  </dgm:styleLbl>
+  <dgm:styleLbl name="asst2">
+    <dgm:scene3d>
+      <a:camera prst="orthographicFront"/>
+      <a:lightRig rig="threePt" dir="t"/>
+    </dgm:scene3d>
+    <dgm:sp3d/>
+    <dgm:txPr/>
+    <dgm:style>
+      <a:lnRef idx="2">
+        <a:scrgbClr r="0" g="0" b="0"/>
+      </a:lnRef>
+      <a:fillRef idx="1">
+        <a:scrgbClr r="0" g="0" b="0"/>
+      </a:fillRef>
+      <a:effectRef idx="0">
+        <a:scrgbClr r="0" g="0" b="0"/>
+      </a:effectRef>
+      <a:fontRef idx="minor">
+        <a:schemeClr val="lt1"/>
+      </a:fontRef>
+    </dgm:style>
+  </dgm:styleLbl>
+  <dgm:styleLbl name="asst3">
+    <dgm:scene3d>
+      <a:camera prst="orthographicFront"/>
+      <a:lightRig rig="threePt" dir="t"/>
+    </dgm:scene3d>
+    <dgm:sp3d/>
+    <dgm:txPr/>
+    <dgm:style>
+      <a:lnRef idx="2">
+        <a:scrgbClr r="0" g="0" b="0"/>
+      </a:lnRef>
+      <a:fillRef idx="1">
+        <a:scrgbClr r="0" g="0" b="0"/>
+      </a:fillRef>
+      <a:effectRef idx="0">
+        <a:scrgbClr r="0" g="0" b="0"/>
+      </a:effectRef>
+      <a:fontRef idx="minor">
+        <a:schemeClr val="lt1"/>
+      </a:fontRef>
+    </dgm:style>
+  </dgm:styleLbl>
+  <dgm:styleLbl name="asst4">
+    <dgm:scene3d>
+      <a:camera prst="orthographicFront"/>
+      <a:lightRig rig="threePt" dir="t"/>
+    </dgm:scene3d>
+    <dgm:sp3d/>
+    <dgm:txPr/>
+    <dgm:style>
+      <a:lnRef idx="2">
+        <a:scrgbClr r="0" g="0" b="0"/>
+      </a:lnRef>
+      <a:fillRef idx="1">
+        <a:scrgbClr r="0" g="0" b="0"/>
+      </a:fillRef>
+      <a:effectRef idx="0">
+        <a:scrgbClr r="0" g="0" b="0"/>
+      </a:effectRef>
+      <a:fontRef idx="minor">
+        <a:schemeClr val="lt1"/>
+      </a:fontRef>
+    </dgm:style>
+  </dgm:styleLbl>
+  <dgm:styleLbl name="parChTrans2D1">
+    <dgm:scene3d>
+      <a:camera prst="orthographicFront"/>
+      <a:lightRig rig="threePt" dir="t"/>
+    </dgm:scene3d>
+    <dgm:sp3d/>
+    <dgm:txPr/>
+    <dgm:style>
+      <a:lnRef idx="2">
+        <a:scrgbClr r="0" g="0" b="0"/>
+      </a:lnRef>
+      <a:fillRef idx="1">
+        <a:scrgbClr r="0" g="0" b="0"/>
+      </a:fillRef>
+      <a:effectRef idx="0">
+        <a:scrgbClr r="0" g="0" b="0"/>
+      </a:effectRef>
+      <a:fontRef idx="minor">
+        <a:schemeClr val="lt1"/>
+      </a:fontRef>
+    </dgm:style>
+  </dgm:styleLbl>
+  <dgm:styleLbl name="parChTrans2D2">
+    <dgm:scene3d>
+      <a:camera prst="orthographicFront"/>
+      <a:lightRig rig="threePt" dir="t"/>
+    </dgm:scene3d>
+    <dgm:sp3d/>
+    <dgm:txPr/>
+    <dgm:style>
+      <a:lnRef idx="2">
+        <a:scrgbClr r="0" g="0" b="0"/>
+      </a:lnRef>
+      <a:fillRef idx="1">
+        <a:scrgbClr r="0" g="0" b="0"/>
+      </a:fillRef>
+      <a:effectRef idx="0">
+        <a:scrgbClr r="0" g="0" b="0"/>
+      </a:effectRef>
+      <a:fontRef idx="minor">
+        <a:schemeClr val="lt1"/>
+      </a:fontRef>
+    </dgm:style>
+  </dgm:styleLbl>
+  <dgm:styleLbl name="parChTrans2D3">
+    <dgm:scene3d>
+      <a:camera prst="orthographicFront"/>
+      <a:lightRig rig="threePt" dir="t"/>
+    </dgm:scene3d>
+    <dgm:sp3d/>
+    <dgm:txPr/>
+    <dgm:style>
+      <a:lnRef idx="2">
+        <a:scrgbClr r="0" g="0" b="0"/>
+      </a:lnRef>
+      <a:fillRef idx="1">
+        <a:scrgbClr r="0" g="0" b="0"/>
+      </a:fillRef>
+      <a:effectRef idx="0">
+        <a:scrgbClr r="0" g="0" b="0"/>
+      </a:effectRef>
+      <a:fontRef idx="minor">
+        <a:schemeClr val="lt1"/>
+      </a:fontRef>
+    </dgm:style>
+  </dgm:styleLbl>
+  <dgm:styleLbl name="parChTrans2D4">
+    <dgm:scene3d>
+      <a:camera prst="orthographicFront"/>
+      <a:lightRig rig="threePt" dir="t"/>
+    </dgm:scene3d>
+    <dgm:sp3d/>
+    <dgm:txPr/>
+    <dgm:style>
+      <a:lnRef idx="2">
+        <a:scrgbClr r="0" g="0" b="0"/>
+      </a:lnRef>
+      <a:fillRef idx="1">
+        <a:scrgbClr r="0" g="0" b="0"/>
+      </a:fillRef>
+      <a:effectRef idx="0">
+        <a:scrgbClr r="0" g="0" b="0"/>
+      </a:effectRef>
+      <a:fontRef idx="minor">
+        <a:schemeClr val="lt1"/>
+      </a:fontRef>
+    </dgm:style>
+  </dgm:styleLbl>
+  <dgm:styleLbl name="parChTrans1D1">
+    <dgm:scene3d>
+      <a:camera prst="orthographicFront"/>
+      <a:lightRig rig="threePt" dir="t"/>
+    </dgm:scene3d>
+    <dgm:sp3d/>
+    <dgm:txPr/>
+    <dgm:style>
+      <a:lnRef idx="2">
+        <a:scrgbClr r="0" g="0" b="0"/>
+      </a:lnRef>
+      <a:fillRef idx="0">
+        <a:scrgbClr r="0" g="0" b="0"/>
+      </a:fillRef>
+      <a:effectRef idx="0">
+        <a:scrgbClr r="0" g="0" b="0"/>
+      </a:effectRef>
+      <a:fontRef idx="minor"/>
+    </dgm:style>
+  </dgm:styleLbl>
+  <dgm:styleLbl name="parChTrans1D2">
+    <dgm:scene3d>
+      <a:camera prst="orthographicFront"/>
+      <a:lightRig rig="threePt" dir="t"/>
+    </dgm:scene3d>
+    <dgm:sp3d/>
+    <dgm:txPr/>
+    <dgm:style>
+      <a:lnRef idx="2">
+        <a:scrgbClr r="0" g="0" b="0"/>
+      </a:lnRef>
+      <a:fillRef idx="0">
+        <a:scrgbClr r="0" g="0" b="0"/>
+      </a:fillRef>
+      <a:effectRef idx="0">
+        <a:scrgbClr r="0" g="0" b="0"/>
+      </a:effectRef>
+      <a:fontRef idx="minor"/>
+    </dgm:style>
+  </dgm:styleLbl>
+  <dgm:styleLbl name="parChTrans1D3">
+    <dgm:scene3d>
+      <a:camera prst="orthographicFront"/>
+      <a:lightRig rig="threePt" dir="t"/>
+    </dgm:scene3d>
+    <dgm:sp3d/>
+    <dgm:txPr/>
+    <dgm:style>
+      <a:lnRef idx="2">
+        <a:scrgbClr r="0" g="0" b="0"/>
+      </a:lnRef>
+      <a:fillRef idx="0">
+        <a:scrgbClr r="0" g="0" b="0"/>
+      </a:fillRef>
+      <a:effectRef idx="0">
+        <a:scrgbClr r="0" g="0" b="0"/>
+      </a:effectRef>
+      <a:fontRef idx="minor"/>
+    </dgm:style>
+  </dgm:styleLbl>
+  <dgm:styleLbl name="parChTrans1D4">
+    <dgm:scene3d>
+      <a:camera prst="orthographicFront"/>
+      <a:lightRig rig="threePt" dir="t"/>
+    </dgm:scene3d>
+    <dgm:sp3d/>
+    <dgm:txPr/>
+    <dgm:style>
+      <a:lnRef idx="2">
+        <a:scrgbClr r="0" g="0" b="0"/>
+      </a:lnRef>
+      <a:fillRef idx="0">
+        <a:scrgbClr r="0" g="0" b="0"/>
+      </a:fillRef>
+      <a:effectRef idx="0">
+        <a:scrgbClr r="0" g="0" b="0"/>
+      </a:effectRef>
+      <a:fontRef idx="minor"/>
+    </dgm:style>
+  </dgm:styleLbl>
+  <dgm:styleLbl name="fgAcc1">
+    <dgm:scene3d>
+      <a:camera prst="orthographicFront"/>
+      <a:lightRig rig="threePt" dir="t"/>
+    </dgm:scene3d>
+    <dgm:sp3d/>
+    <dgm:txPr/>
+    <dgm:style>
+      <a:lnRef idx="2">
+        <a:scrgbClr r="0" g="0" b="0"/>
+      </a:lnRef>
+      <a:fillRef idx="1">
+        <a:scrgbClr r="0" g="0" b="0"/>
+      </a:fillRef>
+      <a:effectRef idx="0">
+        <a:scrgbClr r="0" g="0" b="0"/>
+      </a:effectRef>
+      <a:fontRef idx="minor"/>
+    </dgm:style>
+  </dgm:styleLbl>
+  <dgm:styleLbl name="conFgAcc1">
+    <dgm:scene3d>
+      <a:camera prst="orthographicFront"/>
+      <a:lightRig rig="threePt" dir="t"/>
+    </dgm:scene3d>
+    <dgm:sp3d/>
+    <dgm:txPr/>
+    <dgm:style>
+      <a:lnRef idx="2">
+        <a:scrgbClr r="0" g="0" b="0"/>
+      </a:lnRef>
+      <a:fillRef idx="1">
+        <a:scrgbClr r="0" g="0" b="0"/>
+      </a:fillRef>
+      <a:effectRef idx="0">
+        <a:scrgbClr r="0" g="0" b="0"/>
+      </a:effectRef>
+      <a:fontRef idx="minor"/>
+    </dgm:style>
+  </dgm:styleLbl>
+  <dgm:styleLbl name="alignAcc1">
+    <dgm:scene3d>
+      <a:camera prst="orthographicFront"/>
+      <a:lightRig rig="threePt" dir="t"/>
+    </dgm:scene3d>
+    <dgm:sp3d/>
+    <dgm:txPr/>
+    <dgm:style>
+      <a:lnRef idx="2">
+        <a:scrgbClr r="0" g="0" b="0"/>
+      </a:lnRef>
+      <a:fillRef idx="1">
+        <a:scrgbClr r="0" g="0" b="0"/>
+      </a:fillRef>
+      <a:effectRef idx="0">
+        <a:scrgbClr r="0" g="0" b="0"/>
+      </a:effectRef>
+      <a:fontRef idx="minor"/>
+    </dgm:style>
+  </dgm:styleLbl>
+  <dgm:styleLbl name="trAlignAcc1">
+    <dgm:scene3d>
+      <a:camera prst="orthographicFront"/>
+      <a:lightRig rig="threePt" dir="t"/>
+    </dgm:scene3d>
+    <dgm:sp3d/>
+    <dgm:txPr/>
+    <dgm:style>
+      <a:lnRef idx="1">
+        <a:scrgbClr r="0" g="0" b="0"/>
+      </a:lnRef>
+      <a:fillRef idx="1">
+        <a:scrgbClr r="0" g="0" b="0"/>
+      </a:fillRef>
+      <a:effectRef idx="0">
+        <a:scrgbClr r="0" g="0" b="0"/>
+      </a:effectRef>
+      <a:fontRef idx="minor"/>
+    </dgm:style>
+  </dgm:styleLbl>
+  <dgm:styleLbl name="bgAcc1">
+    <dgm:scene3d>
+      <a:camera prst="orthographicFront"/>
+      <a:lightRig rig="threePt" dir="t"/>
+    </dgm:scene3d>
+    <dgm:sp3d/>
+    <dgm:txPr/>
+    <dgm:style>
+      <a:lnRef idx="2">
+        <a:scrgbClr r="0" g="0" b="0"/>
+      </a:lnRef>
+      <a:fillRef idx="1">
+        <a:scrgbClr r="0" g="0" b="0"/>
+      </a:fillRef>
+      <a:effectRef idx="0">
+        <a:scrgbClr r="0" g="0" b="0"/>
+      </a:effectRef>
+      <a:fontRef idx="minor"/>
+    </dgm:style>
+  </dgm:styleLbl>
+  <dgm:styleLbl name="solidFgAcc1">
+    <dgm:scene3d>
+      <a:camera prst="orthographicFront"/>
+      <a:lightRig rig="threePt" dir="t"/>
+    </dgm:scene3d>
+    <dgm:sp3d/>
+    <dgm:txPr/>
+    <dgm:style>
+      <a:lnRef idx="2">
+        <a:scrgbClr r="0" g="0" b="0"/>
+      </a:lnRef>
+      <a:fillRef idx="1">
+        <a:scrgbClr r="0" g="0" b="0"/>
+      </a:fillRef>
+      <a:effectRef idx="0">
+        <a:scrgbClr r="0" g="0" b="0"/>
+      </a:effectRef>
+      <a:fontRef idx="minor"/>
+    </dgm:style>
+  </dgm:styleLbl>
+  <dgm:styleLbl name="solidAlignAcc1">
+    <dgm:scene3d>
+      <a:camera prst="orthographicFront"/>
+      <a:lightRig rig="threePt" dir="t"/>
+    </dgm:scene3d>
+    <dgm:sp3d/>
+    <dgm:txPr/>
+    <dgm:style>
+      <a:lnRef idx="2">
+        <a:scrgbClr r="0" g="0" b="0"/>
+      </a:lnRef>
+      <a:fillRef idx="1">
+        <a:scrgbClr r="0" g="0" b="0"/>
+      </a:fillRef>
+      <a:effectRef idx="0">
+        <a:scrgbClr r="0" g="0" b="0"/>
+      </a:effectRef>
+      <a:fontRef idx="minor"/>
+    </dgm:style>
+  </dgm:styleLbl>
+  <dgm:styleLbl name="solidBgAcc1">
+    <dgm:scene3d>
+      <a:camera prst="orthographicFront"/>
+      <a:lightRig rig="threePt" dir="t"/>
+    </dgm:scene3d>
+    <dgm:sp3d/>
+    <dgm:txPr/>
+    <dgm:style>
+      <a:lnRef idx="2">
+        <a:scrgbClr r="0" g="0" b="0"/>
+      </a:lnRef>
+      <a:fillRef idx="1">
+        <a:scrgbClr r="0" g="0" b="0"/>
+      </a:fillRef>
+      <a:effectRef idx="0">
+        <a:scrgbClr r="0" g="0" b="0"/>
+      </a:effectRef>
+      <a:fontRef idx="minor"/>
+    </dgm:style>
+  </dgm:styleLbl>
+  <dgm:styleLbl name="fgAccFollowNode1">
+    <dgm:scene3d>
+      <a:camera prst="orthographicFront"/>
+      <a:lightRig rig="threePt" dir="t"/>
+    </dgm:scene3d>
+    <dgm:sp3d/>
+    <dgm:txPr/>
+    <dgm:style>
+      <a:lnRef idx="2">
+        <a:scrgbClr r="0" g="0" b="0"/>
+      </a:lnRef>
+      <a:fillRef idx="1">
+        <a:scrgbClr r="0" g="0" b="0"/>
+      </a:fillRef>
+      <a:effectRef idx="0">
+        <a:scrgbClr r="0" g="0" b="0"/>
+      </a:effectRef>
+      <a:fontRef idx="minor"/>
+    </dgm:style>
+  </dgm:styleLbl>
+  <dgm:styleLbl name="alignAccFollowNode1">
+    <dgm:scene3d>
+      <a:camera prst="orthographicFront"/>
+      <a:lightRig rig="threePt" dir="t"/>
+    </dgm:scene3d>
+    <dgm:sp3d/>
+    <dgm:txPr/>
+    <dgm:style>
+      <a:lnRef idx="2">
+        <a:scrgbClr r="0" g="0" b="0"/>
+      </a:lnRef>
+      <a:fillRef idx="1">
+        <a:scrgbClr r="0" g="0" b="0"/>
+      </a:fillRef>
+      <a:effectRef idx="0">
+        <a:scrgbClr r="0" g="0" b="0"/>
+      </a:effectRef>
+      <a:fontRef idx="minor"/>
+    </dgm:style>
+  </dgm:styleLbl>
+  <dgm:styleLbl name="bgAccFollowNode1">
+    <dgm:scene3d>
+      <a:camera prst="orthographicFront"/>
+      <a:lightRig rig="threePt" dir="t"/>
+    </dgm:scene3d>
+    <dgm:sp3d/>
+    <dgm:txPr/>
+    <dgm:style>
+      <a:lnRef idx="2">
+        <a:scrgbClr r="0" g="0" b="0"/>
+      </a:lnRef>
+      <a:fillRef idx="1">
+        <a:scrgbClr r="0" g="0" b="0"/>
+      </a:fillRef>
+      <a:effectRef idx="0">
+        <a:scrgbClr r="0" g="0" b="0"/>
+      </a:effectRef>
+      <a:fontRef idx="minor"/>
+    </dgm:style>
+  </dgm:styleLbl>
+  <dgm:styleLbl name="fgAcc0">
+    <dgm:scene3d>
+      <a:camera prst="orthographicFront"/>
+      <a:lightRig rig="threePt" dir="t"/>
+    </dgm:scene3d>
+    <dgm:sp3d/>
+    <dgm:txPr/>
+    <dgm:style>
+      <a:lnRef idx="2">
+        <a:scrgbClr r="0" g="0" b="0"/>
+      </a:lnRef>
+      <a:fillRef idx="1">
+        <a:scrgbClr r="0" g="0" b="0"/>
+      </a:fillRef>
+      <a:effectRef idx="0">
+        <a:scrgbClr r="0" g="0" b="0"/>
+      </a:effectRef>
+      <a:fontRef idx="minor"/>
+    </dgm:style>
+  </dgm:styleLbl>
+  <dgm:styleLbl name="fgAcc2">
+    <dgm:scene3d>
+      <a:camera prst="orthographicFront"/>
+      <a:lightRig rig="threePt" dir="t"/>
+    </dgm:scene3d>
+    <dgm:sp3d/>
+    <dgm:txPr/>
+    <dgm:style>
+      <a:lnRef idx="2">
+        <a:scrgbClr r="0" g="0" b="0"/>
+      </a:lnRef>
+      <a:fillRef idx="1">
+        <a:scrgbClr r="0" g="0" b="0"/>
+      </a:fillRef>
+      <a:effectRef idx="0">
+        <a:scrgbClr r="0" g="0" b="0"/>
+      </a:effectRef>
+      <a:fontRef idx="minor"/>
+    </dgm:style>
+  </dgm:styleLbl>
+  <dgm:styleLbl name="fgAcc3">
+    <dgm:scene3d>
+      <a:camera prst="orthographicFront"/>
+      <a:lightRig rig="threePt" dir="t"/>
+    </dgm:scene3d>
+    <dgm:sp3d/>
+    <dgm:txPr/>
+    <dgm:style>
+      <a:lnRef idx="2">
+        <a:scrgbClr r="0" g="0" b="0"/>
+      </a:lnRef>
+      <a:fillRef idx="1">
+        <a:scrgbClr r="0" g="0" b="0"/>
+      </a:fillRef>
+      <a:effectRef idx="0">
+        <a:scrgbClr r="0" g="0" b="0"/>
+      </a:effectRef>
+      <a:fontRef idx="minor"/>
+    </dgm:style>
+  </dgm:styleLbl>
+  <dgm:styleLbl name="fgAcc4">
+    <dgm:scene3d>
+      <a:camera prst="orthographicFront"/>
+      <a:lightRig rig="threePt" dir="t"/>
+    </dgm:scene3d>
+    <dgm:sp3d/>
+    <dgm:txPr/>
+    <dgm:style>
+      <a:lnRef idx="2">
+        <a:scrgbClr r="0" g="0" b="0"/>
+      </a:lnRef>
+      <a:fillRef idx="1">
+        <a:scrgbClr r="0" g="0" b="0"/>
+      </a:fillRef>
+      <a:effectRef idx="0">
+        <a:scrgbClr r="0" g="0" b="0"/>
+      </a:effectRef>
+      <a:fontRef idx="minor"/>
+    </dgm:style>
+  </dgm:styleLbl>
+  <dgm:styleLbl name="bgShp">
+    <dgm:scene3d>
+      <a:camera prst="orthographicFront"/>
+      <a:lightRig rig="threePt" dir="t"/>
+    </dgm:scene3d>
+    <dgm:sp3d/>
+    <dgm:txPr/>
+    <dgm:style>
+      <a:lnRef idx="0">
+        <a:scrgbClr r="0" g="0" b="0"/>
+      </a:lnRef>
+      <a:fillRef idx="1">
+        <a:scrgbClr r="0" g="0" b="0"/>
+      </a:fillRef>
+      <a:effectRef idx="0">
+        <a:scrgbClr r="0" g="0" b="0"/>
+      </a:effectRef>
+      <a:fontRef idx="minor"/>
+    </dgm:style>
+  </dgm:styleLbl>
+  <dgm:styleLbl name="dkBgShp">
+    <dgm:scene3d>
+      <a:camera prst="orthographicFront"/>
+      <a:lightRig rig="threePt" dir="t"/>
+    </dgm:scene3d>
+    <dgm:sp3d/>
+    <dgm:txPr/>
+    <dgm:style>
+      <a:lnRef idx="0">
+        <a:scrgbClr r="0" g="0" b="0"/>
+      </a:lnRef>
+      <a:fillRef idx="1">
+        <a:scrgbClr r="0" g="0" b="0"/>
+      </a:fillRef>
+      <a:effectRef idx="0">
+        <a:scrgbClr r="0" g="0" b="0"/>
+      </a:effectRef>
+      <a:fontRef idx="minor"/>
+    </dgm:style>
+  </dgm:styleLbl>
+  <dgm:styleLbl name="trBgShp">
+    <dgm:scene3d>
+      <a:camera prst="orthographicFront"/>
+      <a:lightRig rig="threePt" dir="t"/>
+    </dgm:scene3d>
+    <dgm:sp3d/>
+    <dgm:txPr/>
+    <dgm:style>
+      <a:lnRef idx="0">
+        <a:scrgbClr r="0" g="0" b="0"/>
+      </a:lnRef>
+      <a:fillRef idx="1">
+        <a:scrgbClr r="0" g="0" b="0"/>
+      </a:fillRef>
+      <a:effectRef idx="0">
+        <a:scrgbClr r="0" g="0" b="0"/>
+      </a:effectRef>
+      <a:fontRef idx="minor"/>
+    </dgm:style>
+  </dgm:styleLbl>
+  <dgm:styleLbl name="fgShp">
+    <dgm:scene3d>
+      <a:camera prst="orthographicFront"/>
+      <a:lightRig rig="threePt" dir="t"/>
+    </dgm:scene3d>
+    <dgm:sp3d/>
+    <dgm:txPr/>
+    <dgm:style>
+      <a:lnRef idx="2">
+        <a:scrgbClr r="0" g="0" b="0"/>
+      </a:lnRef>
+      <a:fillRef idx="1">
+        <a:scrgbClr r="0" g="0" b="0"/>
+      </a:fillRef>
+      <a:effectRef idx="0">
+        <a:scrgbClr r="0" g="0" b="0"/>
+      </a:effectRef>
+      <a:fontRef idx="minor"/>
+    </dgm:style>
+  </dgm:styleLbl>
+  <dgm:styleLbl name="revTx">
+    <dgm:scene3d>
+      <a:camera prst="orthographicFront"/>
+      <a:lightRig rig="threePt" dir="t"/>
+    </dgm:scene3d>
+    <dgm:sp3d/>
+    <dgm:txPr/>
+    <dgm:style>
+      <a:lnRef idx="0">
+        <a:scrgbClr r="0" g="0" b="0"/>
+      </a:lnRef>
+      <a:fillRef idx="0">
+        <a:scrgbClr r="0" g="0" b="0"/>
+      </a:fillRef>
+      <a:effectRef idx="0">
+        <a:scrgbClr r="0" g="0" b="0"/>
+      </a:effectRef>
+      <a:fontRef idx="minor"/>
+    </dgm:style>
+  </dgm:styleLbl>
+</dgm:styleDef>
 </file>
 
 <file path=ppt/slideLayouts/slideLayout1.xml><?xml version="1.0" encoding="utf-8"?>
@@ -6881,36 +9240,41 @@
           </a:p>
         </p:txBody>
       </p:sp>
-      <p:sp>
-        <p:nvSpPr>
-          <p:cNvPr id="3" name="Content Placeholder 2">
+      <p:pic>
+        <p:nvPicPr>
+          <p:cNvPr id="7" name="Content Placeholder 6" descr="A close up of a map&#10;&#10;Description automatically generated">
             <a:extLst>
               <a:ext uri="{FF2B5EF4-FFF2-40B4-BE49-F238E27FC236}">
-                <a16:creationId xmlns:a16="http://schemas.microsoft.com/office/drawing/2014/main" id="{7959FE06-E8B2-4315-B227-9F6700401AAD}"/>
+                <a16:creationId xmlns:a16="http://schemas.microsoft.com/office/drawing/2014/main" id="{0DD3095F-927A-4CDF-BA21-91FACF2B3A5C}"/>
               </a:ext>
             </a:extLst>
           </p:cNvPr>
-          <p:cNvSpPr>
-            <a:spLocks noGrp="1"/>
-          </p:cNvSpPr>
+          <p:cNvPicPr>
+            <a:picLocks noGrp="1" noChangeAspect="1"/>
+          </p:cNvPicPr>
           <p:nvPr>
             <p:ph idx="1"/>
           </p:nvPr>
-        </p:nvSpPr>
-        <p:spPr>
-          <a:xfrm>
-            <a:off x="1097280" y="1973179"/>
-            <a:ext cx="10058400" cy="3895915"/>
-          </a:xfrm>
-        </p:spPr>
-        <p:txBody>
-          <a:bodyPr/>
-          <a:lstStyle/>
-          <a:p>
-            <a:endParaRPr lang="en-US" dirty="0"/>
-          </a:p>
-        </p:txBody>
-      </p:sp>
+        </p:nvPicPr>
+        <p:blipFill>
+          <a:blip r:embed="rId2">
+            <a:extLst>
+              <a:ext uri="{28A0092B-C50C-407E-A947-70E740481C1C}">
+                <a14:useLocalDpi xmlns:a14="http://schemas.microsoft.com/office/drawing/2010/main" val="0"/>
+              </a:ext>
+            </a:extLst>
+          </a:blip>
+          <a:stretch>
+            <a:fillRect/>
+          </a:stretch>
+        </p:blipFill>
+        <p:spPr>
+          <a:xfrm>
+            <a:off x="2424345" y="1704069"/>
+            <a:ext cx="7343310" cy="4830544"/>
+          </a:xfrm>
+        </p:spPr>
+      </p:pic>
       <p:sp>
         <p:nvSpPr>
           <p:cNvPr id="4" name="Title 1">
@@ -7023,6 +9387,34 @@
           </a:fontRef>
         </p:style>
       </p:cxnSp>
+      <p:graphicFrame>
+        <p:nvGraphicFramePr>
+          <p:cNvPr id="8" name="Diagram 7">
+            <a:extLst>
+              <a:ext uri="{FF2B5EF4-FFF2-40B4-BE49-F238E27FC236}">
+                <a16:creationId xmlns:a16="http://schemas.microsoft.com/office/drawing/2014/main" id="{A0125501-65E7-493B-81C3-DDF8149A1EA9}"/>
+              </a:ext>
+            </a:extLst>
+          </p:cNvPr>
+          <p:cNvGraphicFramePr/>
+          <p:nvPr>
+            <p:extLst>
+              <p:ext uri="{D42A27DB-BD31-4B8C-83A1-F6EECF244321}">
+                <p14:modId xmlns:p14="http://schemas.microsoft.com/office/powerpoint/2010/main" val="3594786635"/>
+              </p:ext>
+            </p:extLst>
+          </p:nvPr>
+        </p:nvGraphicFramePr>
+        <p:xfrm>
+          <a:off x="1999916" y="1507960"/>
+          <a:ext cx="9662695" cy="5350040"/>
+        </p:xfrm>
+        <a:graphic>
+          <a:graphicData uri="http://schemas.openxmlformats.org/drawingml/2006/diagram">
+            <dgm:relIds xmlns:dgm="http://schemas.openxmlformats.org/drawingml/2006/diagram" xmlns:r="http://schemas.openxmlformats.org/officeDocument/2006/relationships" r:dm="rId3" r:lo="rId4" r:qs="rId5" r:cs="rId6"/>
+          </a:graphicData>
+        </a:graphic>
+      </p:graphicFrame>
     </p:spTree>
     <p:extLst>
       <p:ext uri="{BB962C8B-B14F-4D97-AF65-F5344CB8AC3E}">

</xml_diff>